<commit_message>
updating way the saccade pdf is generated
noticed an error where I was making my pdfs in a way that required independent samples from both xa and xv even when the number of causes is one. This is an issue when comparing to data because for these trials I onle have one saccade so sa = sv. Fixed this by keeping the C=1 and C=2 cases separate until after the integration step, and then summing them
</commit_message>
<xml_diff>
--- a/doc/model_summary_4_16_19.pptx
+++ b/doc/model_summary_4_16_19.pptx
@@ -109,6 +109,11 @@
       </a:defRPr>
     </a:lvl9pPr>
   </p:defaultTextStyle>
+  <p:extLst>
+    <p:ext uri="{EFAFB233-063F-42B5-8137-9DF3F51BA10A}">
+      <p15:sldGuideLst xmlns:p15="http://schemas.microsoft.com/office/powerpoint/2012/main"/>
+    </p:ext>
+  </p:extLst>
 </p:presentation>
 </file>
 
@@ -3097,7 +3102,7 @@
         </p:spPr>
         <p:txBody>
           <a:bodyPr>
-            <a:normAutofit lnSpcReduction="10000"/>
+            <a:normAutofit fontScale="85000" lnSpcReduction="10000"/>
           </a:bodyPr>
           <a:lstStyle/>
           <a:p>
@@ -3155,12 +3160,33 @@
             <a:pPr lvl="1"/>
             <a:r>
               <a:rPr lang="en-US" dirty="0" smtClean="0"/>
-              <a:t>Probabilistic fusion - null (randomly choose with fixed probability = prior common)</a:t>
-            </a:r>
-          </a:p>
-          <a:p>
-            <a:pPr lvl="2"/>
+              <a:t>Probabilistic fusion - null (randomly choose with fixed probability = prior common</a:t>
+            </a:r>
+            <a:r>
+              <a:rPr lang="en-US" dirty="0" smtClean="0"/>
+              <a:t>)</a:t>
+            </a:r>
             <a:endParaRPr lang="en-US" dirty="0"/>
+          </a:p>
+          <a:p>
+            <a:endParaRPr lang="en-US" dirty="0"/>
+          </a:p>
+          <a:p>
+            <a:r>
+              <a:rPr lang="en-US" dirty="0" smtClean="0"/>
+              <a:t>Binning saccade locations in 1 degree bins</a:t>
+            </a:r>
+          </a:p>
+          <a:p>
+            <a:r>
+              <a:rPr lang="en-US" dirty="0"/>
+              <a:t>N</a:t>
+            </a:r>
+            <a:r>
+              <a:rPr lang="en-US" dirty="0" smtClean="0"/>
+              <a:t>umerically integrating from -60 to +60 for each condition </a:t>
+            </a:r>
+            <a:endParaRPr lang="en-US" dirty="0" smtClean="0"/>
           </a:p>
         </p:txBody>
       </p:sp>
@@ -3901,26 +3927,172 @@
           <a:bodyPr/>
           <a:lstStyle/>
           <a:p>
-            <a:endParaRPr lang="en-US"/>
-          </a:p>
-        </p:txBody>
-      </p:sp>
-      <p:sp>
-        <p:nvSpPr>
-          <p:cNvPr id="3" name="Content Placeholder 2"/>
-          <p:cNvSpPr>
-            <a:spLocks noGrp="1"/>
-          </p:cNvSpPr>
-          <p:nvPr>
-            <p:ph idx="1"/>
-          </p:nvPr>
-        </p:nvSpPr>
-        <p:spPr/>
-        <p:txBody>
-          <a:bodyPr/>
-          <a:lstStyle/>
-          <a:p>
-            <a:endParaRPr lang="en-US"/>
+            <a:r>
+              <a:rPr lang="en-US" dirty="0" smtClean="0"/>
+              <a:t>Posterior distribution question</a:t>
+            </a:r>
+            <a:endParaRPr lang="en-US" dirty="0"/>
+          </a:p>
+        </p:txBody>
+      </p:sp>
+      <p:pic>
+        <p:nvPicPr>
+          <p:cNvPr id="1026" name="Picture 2" descr="https://lh5.googleusercontent.com/CN7rvgoLx4vL-t4ZhvRb4xKFJ9lH1kL2UC7XULAtQ0eRH0BYSGiL0cJdrd_m6Ix8wABD6pOLRXF-oJpQsPgAuFkiS6BbA_rjhXJbhbGV8WXLOW6FvJIyQbOPTEEjbPaQrAfvGM6M"/>
+          <p:cNvPicPr>
+            <a:picLocks noChangeAspect="1" noChangeArrowheads="1"/>
+          </p:cNvPicPr>
+          <p:nvPr/>
+        </p:nvPicPr>
+        <p:blipFill>
+          <a:blip r:embed="rId2">
+            <a:extLst>
+              <a:ext uri="{28A0092B-C50C-407E-A947-70E740481C1C}">
+                <a14:useLocalDpi xmlns:a14="http://schemas.microsoft.com/office/drawing/2010/main" val="0"/>
+              </a:ext>
+            </a:extLst>
+          </a:blip>
+          <a:srcRect/>
+          <a:stretch>
+            <a:fillRect/>
+          </a:stretch>
+        </p:blipFill>
+        <p:spPr bwMode="auto">
+          <a:xfrm>
+            <a:off x="390331" y="2211972"/>
+            <a:ext cx="5486400" cy="4114800"/>
+          </a:xfrm>
+          <a:prstGeom prst="rect">
+            <a:avLst/>
+          </a:prstGeom>
+          <a:noFill/>
+          <a:extLst>
+            <a:ext uri="{909E8E84-426E-40DD-AFC4-6F175D3DCCD1}">
+              <a14:hiddenFill xmlns:a14="http://schemas.microsoft.com/office/drawing/2010/main">
+                <a:solidFill>
+                  <a:srgbClr val="FFFFFF"/>
+                </a:solidFill>
+              </a14:hiddenFill>
+            </a:ext>
+          </a:extLst>
+        </p:spPr>
+      </p:pic>
+      <p:sp>
+        <p:nvSpPr>
+          <p:cNvPr id="4" name="TextBox 3"/>
+          <p:cNvSpPr txBox="1"/>
+          <p:nvPr/>
+        </p:nvSpPr>
+        <p:spPr>
+          <a:xfrm>
+            <a:off x="699341" y="970384"/>
+            <a:ext cx="10432079" cy="646331"/>
+          </a:xfrm>
+          <a:prstGeom prst="rect">
+            <a:avLst/>
+          </a:prstGeom>
+          <a:noFill/>
+        </p:spPr>
+        <p:txBody>
+          <a:bodyPr wrap="square" rtlCol="0">
+            <a:spAutoFit/>
+          </a:bodyPr>
+          <a:lstStyle/>
+          <a:p>
+            <a:r>
+              <a:rPr lang="en-US" dirty="0" smtClean="0"/>
+              <a:t>Dot on right side should be concentrated on the diagonal (because it is mostly impossible for me to get a response of like [-6A,-7V], for instance).</a:t>
+            </a:r>
+            <a:endParaRPr lang="en-US" dirty="0"/>
+          </a:p>
+        </p:txBody>
+      </p:sp>
+      <p:pic>
+        <p:nvPicPr>
+          <p:cNvPr id="5" name="Picture 4"/>
+          <p:cNvPicPr>
+            <a:picLocks noChangeAspect="1"/>
+          </p:cNvPicPr>
+          <p:nvPr/>
+        </p:nvPicPr>
+        <p:blipFill>
+          <a:blip r:embed="rId3">
+            <a:extLst>
+              <a:ext uri="{28A0092B-C50C-407E-A947-70E740481C1C}">
+                <a14:useLocalDpi xmlns:a14="http://schemas.microsoft.com/office/drawing/2010/main" val="0"/>
+              </a:ext>
+            </a:extLst>
+          </a:blip>
+          <a:stretch>
+            <a:fillRect/>
+          </a:stretch>
+        </p:blipFill>
+        <p:spPr>
+          <a:xfrm>
+            <a:off x="6143840" y="2211971"/>
+            <a:ext cx="5486399" cy="4114800"/>
+          </a:xfrm>
+          <a:prstGeom prst="rect">
+            <a:avLst/>
+          </a:prstGeom>
+        </p:spPr>
+      </p:pic>
+      <p:sp>
+        <p:nvSpPr>
+          <p:cNvPr id="6" name="TextBox 5"/>
+          <p:cNvSpPr txBox="1"/>
+          <p:nvPr/>
+        </p:nvSpPr>
+        <p:spPr>
+          <a:xfrm>
+            <a:off x="2118049" y="1931437"/>
+            <a:ext cx="2765372" cy="369332"/>
+          </a:xfrm>
+          <a:prstGeom prst="rect">
+            <a:avLst/>
+          </a:prstGeom>
+          <a:noFill/>
+        </p:spPr>
+        <p:txBody>
+          <a:bodyPr wrap="none" rtlCol="0">
+            <a:spAutoFit/>
+          </a:bodyPr>
+          <a:lstStyle/>
+          <a:p>
+            <a:r>
+              <a:rPr lang="en-US" dirty="0" smtClean="0"/>
+              <a:t>MAP estimated distribution</a:t>
+            </a:r>
+            <a:endParaRPr lang="en-US" dirty="0"/>
+          </a:p>
+        </p:txBody>
+      </p:sp>
+      <p:sp>
+        <p:nvSpPr>
+          <p:cNvPr id="8" name="TextBox 7"/>
+          <p:cNvSpPr txBox="1"/>
+          <p:nvPr/>
+        </p:nvSpPr>
+        <p:spPr>
+          <a:xfrm>
+            <a:off x="8702224" y="1931437"/>
+            <a:ext cx="620554" cy="369332"/>
+          </a:xfrm>
+          <a:prstGeom prst="rect">
+            <a:avLst/>
+          </a:prstGeom>
+          <a:noFill/>
+        </p:spPr>
+        <p:txBody>
+          <a:bodyPr wrap="none" rtlCol="0">
+            <a:spAutoFit/>
+          </a:bodyPr>
+          <a:lstStyle/>
+          <a:p>
+            <a:r>
+              <a:rPr lang="en-US" dirty="0" smtClean="0"/>
+              <a:t>Data</a:t>
+            </a:r>
+            <a:endParaRPr lang="en-US" dirty="0"/>
           </a:p>
         </p:txBody>
       </p:sp>
@@ -4373,7 +4545,7 @@
         <p:spPr>
           <a:xfrm>
             <a:off x="1436915" y="3116424"/>
-            <a:ext cx="6179640" cy="1477328"/>
+            <a:ext cx="13515046" cy="1477328"/>
           </a:xfrm>
           <a:prstGeom prst="rect">
             <a:avLst/>
@@ -4400,16 +4572,11 @@
               <a:rPr lang="en-US" u="sng" dirty="0" smtClean="0"/>
               <a:t>A_sig = 5.32 </a:t>
             </a:r>
-            <a:endParaRPr lang="en-US" u="sng" dirty="0" smtClean="0"/>
           </a:p>
           <a:p>
             <a:r>
               <a:rPr lang="en-US" dirty="0" smtClean="0"/>
-              <a:t>Yoko V_sig = 1.33,</a:t>
-            </a:r>
-            <a:r>
-              <a:rPr lang="en-US" dirty="0" smtClean="0"/>
-              <a:t> </a:t>
+              <a:t>Yoko V_sig = 1.33, </a:t>
             </a:r>
             <a:r>
               <a:rPr lang="en-US" u="sng" dirty="0" smtClean="0"/>
@@ -4422,7 +4589,23 @@
           <a:p>
             <a:r>
               <a:rPr lang="en-US" dirty="0" smtClean="0"/>
-              <a:t>Accounting for prior this would be something like </a:t>
+              <a:t>This doesn’t account for the prior though, and after combining the prior variance with </a:t>
+            </a:r>
+            <a:r>
+              <a:rPr lang="en-US" dirty="0" err="1" smtClean="0"/>
+              <a:t>A_sig</a:t>
+            </a:r>
+            <a:r>
+              <a:rPr lang="en-US" dirty="0" smtClean="0"/>
+              <a:t> you will end up with something </a:t>
+            </a:r>
+            <a:r>
+              <a:rPr lang="en-US" dirty="0" err="1" smtClean="0"/>
+              <a:t>kindof</a:t>
+            </a:r>
+            <a:r>
+              <a:rPr lang="en-US" dirty="0" smtClean="0"/>
+              <a:t> close to this</a:t>
             </a:r>
             <a:endParaRPr lang="en-US" dirty="0"/>
           </a:p>

</xml_diff>

<commit_message>
more example plot work
</commit_message>
<xml_diff>
--- a/doc/model_summary_4_16_19.pptx
+++ b/doc/model_summary_4_16_19.pptx
@@ -4,13 +4,25 @@
   <p:sldMasterIdLst>
     <p:sldMasterId id="2147483648" r:id="rId1"/>
   </p:sldMasterIdLst>
+  <p:notesMasterIdLst>
+    <p:notesMasterId r:id="rId17"/>
+  </p:notesMasterIdLst>
   <p:sldIdLst>
     <p:sldId id="256" r:id="rId2"/>
     <p:sldId id="257" r:id="rId3"/>
     <p:sldId id="258" r:id="rId4"/>
     <p:sldId id="259" r:id="rId5"/>
     <p:sldId id="260" r:id="rId6"/>
-    <p:sldId id="261" r:id="rId7"/>
+    <p:sldId id="262" r:id="rId7"/>
+    <p:sldId id="264" r:id="rId8"/>
+    <p:sldId id="267" r:id="rId9"/>
+    <p:sldId id="269" r:id="rId10"/>
+    <p:sldId id="270" r:id="rId11"/>
+    <p:sldId id="265" r:id="rId12"/>
+    <p:sldId id="273" r:id="rId13"/>
+    <p:sldId id="274" r:id="rId14"/>
+    <p:sldId id="275" r:id="rId15"/>
+    <p:sldId id="271" r:id="rId16"/>
   </p:sldIdLst>
   <p:sldSz cx="12192000" cy="6858000"/>
   <p:notesSz cx="6858000" cy="9144000"/>
@@ -111,10 +123,458 @@
   </p:defaultTextStyle>
   <p:extLst>
     <p:ext uri="{EFAFB233-063F-42B5-8137-9DF3F51BA10A}">
-      <p15:sldGuideLst xmlns:p15="http://schemas.microsoft.com/office/powerpoint/2012/main"/>
+      <p15:sldGuideLst xmlns:p15="http://schemas.microsoft.com/office/powerpoint/2012/main">
+        <p15:guide id="1" orient="horz" pos="2160">
+          <p15:clr>
+            <a:srgbClr val="A4A3A4"/>
+          </p15:clr>
+        </p15:guide>
+        <p15:guide id="2" pos="3840">
+          <p15:clr>
+            <a:srgbClr val="A4A3A4"/>
+          </p15:clr>
+        </p15:guide>
+      </p15:sldGuideLst>
     </p:ext>
   </p:extLst>
 </p:presentation>
+</file>
+
+<file path=ppt/notesMasters/notesMaster1.xml><?xml version="1.0" encoding="utf-8"?>
+<p:notesMaster xmlns:a="http://schemas.openxmlformats.org/drawingml/2006/main" xmlns:r="http://schemas.openxmlformats.org/officeDocument/2006/relationships" xmlns:p="http://schemas.openxmlformats.org/presentationml/2006/main">
+  <p:cSld>
+    <p:bg>
+      <p:bgRef idx="1001">
+        <a:schemeClr val="bg1"/>
+      </p:bgRef>
+    </p:bg>
+    <p:spTree>
+      <p:nvGrpSpPr>
+        <p:cNvPr id="1" name=""/>
+        <p:cNvGrpSpPr/>
+        <p:nvPr/>
+      </p:nvGrpSpPr>
+      <p:grpSpPr>
+        <a:xfrm>
+          <a:off x="0" y="0"/>
+          <a:ext cx="0" cy="0"/>
+          <a:chOff x="0" y="0"/>
+          <a:chExt cx="0" cy="0"/>
+        </a:xfrm>
+      </p:grpSpPr>
+      <p:sp>
+        <p:nvSpPr>
+          <p:cNvPr id="2" name="Header Placeholder 1"/>
+          <p:cNvSpPr>
+            <a:spLocks noGrp="1"/>
+          </p:cNvSpPr>
+          <p:nvPr>
+            <p:ph type="hdr" sz="quarter"/>
+          </p:nvPr>
+        </p:nvSpPr>
+        <p:spPr>
+          <a:xfrm>
+            <a:off x="0" y="0"/>
+            <a:ext cx="2971800" cy="458788"/>
+          </a:xfrm>
+          <a:prstGeom prst="rect">
+            <a:avLst/>
+          </a:prstGeom>
+        </p:spPr>
+        <p:txBody>
+          <a:bodyPr vert="horz" lIns="91440" tIns="45720" rIns="91440" bIns="45720" rtlCol="0"/>
+          <a:lstStyle>
+            <a:lvl1pPr algn="l">
+              <a:defRPr sz="1200"/>
+            </a:lvl1pPr>
+          </a:lstStyle>
+          <a:p>
+            <a:endParaRPr lang="en-US"/>
+          </a:p>
+        </p:txBody>
+      </p:sp>
+      <p:sp>
+        <p:nvSpPr>
+          <p:cNvPr id="3" name="Date Placeholder 2"/>
+          <p:cNvSpPr>
+            <a:spLocks noGrp="1"/>
+          </p:cNvSpPr>
+          <p:nvPr>
+            <p:ph type="dt" idx="1"/>
+          </p:nvPr>
+        </p:nvSpPr>
+        <p:spPr>
+          <a:xfrm>
+            <a:off x="3884613" y="0"/>
+            <a:ext cx="2971800" cy="458788"/>
+          </a:xfrm>
+          <a:prstGeom prst="rect">
+            <a:avLst/>
+          </a:prstGeom>
+        </p:spPr>
+        <p:txBody>
+          <a:bodyPr vert="horz" lIns="91440" tIns="45720" rIns="91440" bIns="45720" rtlCol="0"/>
+          <a:lstStyle>
+            <a:lvl1pPr algn="r">
+              <a:defRPr sz="1200"/>
+            </a:lvl1pPr>
+          </a:lstStyle>
+          <a:p>
+            <a:fld id="{143C1751-C50F-412E-A504-98E238770D5D}" type="datetimeFigureOut">
+              <a:rPr lang="en-US" smtClean="0"/>
+              <a:t>4/18/2019</a:t>
+            </a:fld>
+            <a:endParaRPr lang="en-US"/>
+          </a:p>
+        </p:txBody>
+      </p:sp>
+      <p:sp>
+        <p:nvSpPr>
+          <p:cNvPr id="4" name="Slide Image Placeholder 3"/>
+          <p:cNvSpPr>
+            <a:spLocks noGrp="1" noRot="1" noChangeAspect="1"/>
+          </p:cNvSpPr>
+          <p:nvPr>
+            <p:ph type="sldImg" idx="2"/>
+          </p:nvPr>
+        </p:nvSpPr>
+        <p:spPr>
+          <a:xfrm>
+            <a:off x="685800" y="1143000"/>
+            <a:ext cx="5486400" cy="3086100"/>
+          </a:xfrm>
+          <a:prstGeom prst="rect">
+            <a:avLst/>
+          </a:prstGeom>
+          <a:noFill/>
+          <a:ln w="12700">
+            <a:solidFill>
+              <a:prstClr val="black"/>
+            </a:solidFill>
+          </a:ln>
+        </p:spPr>
+        <p:txBody>
+          <a:bodyPr vert="horz" lIns="91440" tIns="45720" rIns="91440" bIns="45720" rtlCol="0" anchor="ctr"/>
+          <a:lstStyle/>
+          <a:p>
+            <a:endParaRPr lang="en-US"/>
+          </a:p>
+        </p:txBody>
+      </p:sp>
+      <p:sp>
+        <p:nvSpPr>
+          <p:cNvPr id="5" name="Notes Placeholder 4"/>
+          <p:cNvSpPr>
+            <a:spLocks noGrp="1"/>
+          </p:cNvSpPr>
+          <p:nvPr>
+            <p:ph type="body" sz="quarter" idx="3"/>
+          </p:nvPr>
+        </p:nvSpPr>
+        <p:spPr>
+          <a:xfrm>
+            <a:off x="685800" y="4400550"/>
+            <a:ext cx="5486400" cy="3600450"/>
+          </a:xfrm>
+          <a:prstGeom prst="rect">
+            <a:avLst/>
+          </a:prstGeom>
+        </p:spPr>
+        <p:txBody>
+          <a:bodyPr vert="horz" lIns="91440" tIns="45720" rIns="91440" bIns="45720" rtlCol="0"/>
+          <a:lstStyle/>
+          <a:p>
+            <a:pPr lvl="0"/>
+            <a:r>
+              <a:rPr lang="en-US" smtClean="0"/>
+              <a:t>Click to edit Master text styles</a:t>
+            </a:r>
+          </a:p>
+          <a:p>
+            <a:pPr lvl="1"/>
+            <a:r>
+              <a:rPr lang="en-US" smtClean="0"/>
+              <a:t>Second level</a:t>
+            </a:r>
+          </a:p>
+          <a:p>
+            <a:pPr lvl="2"/>
+            <a:r>
+              <a:rPr lang="en-US" smtClean="0"/>
+              <a:t>Third level</a:t>
+            </a:r>
+          </a:p>
+          <a:p>
+            <a:pPr lvl="3"/>
+            <a:r>
+              <a:rPr lang="en-US" smtClean="0"/>
+              <a:t>Fourth level</a:t>
+            </a:r>
+          </a:p>
+          <a:p>
+            <a:pPr lvl="4"/>
+            <a:r>
+              <a:rPr lang="en-US" smtClean="0"/>
+              <a:t>Fifth level</a:t>
+            </a:r>
+            <a:endParaRPr lang="en-US"/>
+          </a:p>
+        </p:txBody>
+      </p:sp>
+      <p:sp>
+        <p:nvSpPr>
+          <p:cNvPr id="6" name="Footer Placeholder 5"/>
+          <p:cNvSpPr>
+            <a:spLocks noGrp="1"/>
+          </p:cNvSpPr>
+          <p:nvPr>
+            <p:ph type="ftr" sz="quarter" idx="4"/>
+          </p:nvPr>
+        </p:nvSpPr>
+        <p:spPr>
+          <a:xfrm>
+            <a:off x="0" y="8685213"/>
+            <a:ext cx="2971800" cy="458787"/>
+          </a:xfrm>
+          <a:prstGeom prst="rect">
+            <a:avLst/>
+          </a:prstGeom>
+        </p:spPr>
+        <p:txBody>
+          <a:bodyPr vert="horz" lIns="91440" tIns="45720" rIns="91440" bIns="45720" rtlCol="0" anchor="b"/>
+          <a:lstStyle>
+            <a:lvl1pPr algn="l">
+              <a:defRPr sz="1200"/>
+            </a:lvl1pPr>
+          </a:lstStyle>
+          <a:p>
+            <a:endParaRPr lang="en-US"/>
+          </a:p>
+        </p:txBody>
+      </p:sp>
+      <p:sp>
+        <p:nvSpPr>
+          <p:cNvPr id="7" name="Slide Number Placeholder 6"/>
+          <p:cNvSpPr>
+            <a:spLocks noGrp="1"/>
+          </p:cNvSpPr>
+          <p:nvPr>
+            <p:ph type="sldNum" sz="quarter" idx="5"/>
+          </p:nvPr>
+        </p:nvSpPr>
+        <p:spPr>
+          <a:xfrm>
+            <a:off x="3884613" y="8685213"/>
+            <a:ext cx="2971800" cy="458787"/>
+          </a:xfrm>
+          <a:prstGeom prst="rect">
+            <a:avLst/>
+          </a:prstGeom>
+        </p:spPr>
+        <p:txBody>
+          <a:bodyPr vert="horz" lIns="91440" tIns="45720" rIns="91440" bIns="45720" rtlCol="0" anchor="b"/>
+          <a:lstStyle>
+            <a:lvl1pPr algn="r">
+              <a:defRPr sz="1200"/>
+            </a:lvl1pPr>
+          </a:lstStyle>
+          <a:p>
+            <a:fld id="{6DA1C151-7BA6-414C-92F9-7F76D13D16A9}" type="slidenum">
+              <a:rPr lang="en-US" smtClean="0"/>
+              <a:t>‹#›</a:t>
+            </a:fld>
+            <a:endParaRPr lang="en-US"/>
+          </a:p>
+        </p:txBody>
+      </p:sp>
+    </p:spTree>
+    <p:extLst>
+      <p:ext uri="{BB962C8B-B14F-4D97-AF65-F5344CB8AC3E}">
+        <p14:creationId xmlns:p14="http://schemas.microsoft.com/office/powerpoint/2010/main" val="729973449"/>
+      </p:ext>
+    </p:extLst>
+  </p:cSld>
+  <p:clrMap bg1="lt1" tx1="dk1" bg2="lt2" tx2="dk2" accent1="accent1" accent2="accent2" accent3="accent3" accent4="accent4" accent5="accent5" accent6="accent6" hlink="hlink" folHlink="folHlink"/>
+  <p:notesStyle>
+    <a:lvl1pPr marL="0" algn="l" defTabSz="914400" rtl="0" eaLnBrk="1" latinLnBrk="0" hangingPunct="1">
+      <a:defRPr sz="1200" kern="1200">
+        <a:solidFill>
+          <a:schemeClr val="tx1"/>
+        </a:solidFill>
+        <a:latin typeface="+mn-lt"/>
+        <a:ea typeface="+mn-ea"/>
+        <a:cs typeface="+mn-cs"/>
+      </a:defRPr>
+    </a:lvl1pPr>
+    <a:lvl2pPr marL="457200" algn="l" defTabSz="914400" rtl="0" eaLnBrk="1" latinLnBrk="0" hangingPunct="1">
+      <a:defRPr sz="1200" kern="1200">
+        <a:solidFill>
+          <a:schemeClr val="tx1"/>
+        </a:solidFill>
+        <a:latin typeface="+mn-lt"/>
+        <a:ea typeface="+mn-ea"/>
+        <a:cs typeface="+mn-cs"/>
+      </a:defRPr>
+    </a:lvl2pPr>
+    <a:lvl3pPr marL="914400" algn="l" defTabSz="914400" rtl="0" eaLnBrk="1" latinLnBrk="0" hangingPunct="1">
+      <a:defRPr sz="1200" kern="1200">
+        <a:solidFill>
+          <a:schemeClr val="tx1"/>
+        </a:solidFill>
+        <a:latin typeface="+mn-lt"/>
+        <a:ea typeface="+mn-ea"/>
+        <a:cs typeface="+mn-cs"/>
+      </a:defRPr>
+    </a:lvl3pPr>
+    <a:lvl4pPr marL="1371600" algn="l" defTabSz="914400" rtl="0" eaLnBrk="1" latinLnBrk="0" hangingPunct="1">
+      <a:defRPr sz="1200" kern="1200">
+        <a:solidFill>
+          <a:schemeClr val="tx1"/>
+        </a:solidFill>
+        <a:latin typeface="+mn-lt"/>
+        <a:ea typeface="+mn-ea"/>
+        <a:cs typeface="+mn-cs"/>
+      </a:defRPr>
+    </a:lvl4pPr>
+    <a:lvl5pPr marL="1828800" algn="l" defTabSz="914400" rtl="0" eaLnBrk="1" latinLnBrk="0" hangingPunct="1">
+      <a:defRPr sz="1200" kern="1200">
+        <a:solidFill>
+          <a:schemeClr val="tx1"/>
+        </a:solidFill>
+        <a:latin typeface="+mn-lt"/>
+        <a:ea typeface="+mn-ea"/>
+        <a:cs typeface="+mn-cs"/>
+      </a:defRPr>
+    </a:lvl5pPr>
+    <a:lvl6pPr marL="2286000" algn="l" defTabSz="914400" rtl="0" eaLnBrk="1" latinLnBrk="0" hangingPunct="1">
+      <a:defRPr sz="1200" kern="1200">
+        <a:solidFill>
+          <a:schemeClr val="tx1"/>
+        </a:solidFill>
+        <a:latin typeface="+mn-lt"/>
+        <a:ea typeface="+mn-ea"/>
+        <a:cs typeface="+mn-cs"/>
+      </a:defRPr>
+    </a:lvl6pPr>
+    <a:lvl7pPr marL="2743200" algn="l" defTabSz="914400" rtl="0" eaLnBrk="1" latinLnBrk="0" hangingPunct="1">
+      <a:defRPr sz="1200" kern="1200">
+        <a:solidFill>
+          <a:schemeClr val="tx1"/>
+        </a:solidFill>
+        <a:latin typeface="+mn-lt"/>
+        <a:ea typeface="+mn-ea"/>
+        <a:cs typeface="+mn-cs"/>
+      </a:defRPr>
+    </a:lvl7pPr>
+    <a:lvl8pPr marL="3200400" algn="l" defTabSz="914400" rtl="0" eaLnBrk="1" latinLnBrk="0" hangingPunct="1">
+      <a:defRPr sz="1200" kern="1200">
+        <a:solidFill>
+          <a:schemeClr val="tx1"/>
+        </a:solidFill>
+        <a:latin typeface="+mn-lt"/>
+        <a:ea typeface="+mn-ea"/>
+        <a:cs typeface="+mn-cs"/>
+      </a:defRPr>
+    </a:lvl8pPr>
+    <a:lvl9pPr marL="3657600" algn="l" defTabSz="914400" rtl="0" eaLnBrk="1" latinLnBrk="0" hangingPunct="1">
+      <a:defRPr sz="1200" kern="1200">
+        <a:solidFill>
+          <a:schemeClr val="tx1"/>
+        </a:solidFill>
+        <a:latin typeface="+mn-lt"/>
+        <a:ea typeface="+mn-ea"/>
+        <a:cs typeface="+mn-cs"/>
+      </a:defRPr>
+    </a:lvl9pPr>
+  </p:notesStyle>
+</p:notesMaster>
+</file>
+
+<file path=ppt/notesSlides/notesSlide1.xml><?xml version="1.0" encoding="utf-8"?>
+<p:notes xmlns:a="http://schemas.openxmlformats.org/drawingml/2006/main" xmlns:r="http://schemas.openxmlformats.org/officeDocument/2006/relationships" xmlns:p="http://schemas.openxmlformats.org/presentationml/2006/main">
+  <p:cSld>
+    <p:spTree>
+      <p:nvGrpSpPr>
+        <p:cNvPr id="1" name=""/>
+        <p:cNvGrpSpPr/>
+        <p:nvPr/>
+      </p:nvGrpSpPr>
+      <p:grpSpPr>
+        <a:xfrm>
+          <a:off x="0" y="0"/>
+          <a:ext cx="0" cy="0"/>
+          <a:chOff x="0" y="0"/>
+          <a:chExt cx="0" cy="0"/>
+        </a:xfrm>
+      </p:grpSpPr>
+      <p:sp>
+        <p:nvSpPr>
+          <p:cNvPr id="2" name="Slide Image Placeholder 1"/>
+          <p:cNvSpPr>
+            <a:spLocks noGrp="1" noRot="1" noChangeAspect="1"/>
+          </p:cNvSpPr>
+          <p:nvPr>
+            <p:ph type="sldImg"/>
+          </p:nvPr>
+        </p:nvSpPr>
+        <p:spPr/>
+      </p:sp>
+      <p:sp>
+        <p:nvSpPr>
+          <p:cNvPr id="3" name="Notes Placeholder 2"/>
+          <p:cNvSpPr>
+            <a:spLocks noGrp="1"/>
+          </p:cNvSpPr>
+          <p:nvPr>
+            <p:ph type="body" idx="1"/>
+          </p:nvPr>
+        </p:nvSpPr>
+        <p:spPr/>
+        <p:txBody>
+          <a:bodyPr/>
+          <a:lstStyle/>
+          <a:p>
+            <a:r>
+              <a:rPr lang="en-US" dirty="0" smtClean="0"/>
+              <a:t>Juno</a:t>
+            </a:r>
+          </a:p>
+        </p:txBody>
+      </p:sp>
+      <p:sp>
+        <p:nvSpPr>
+          <p:cNvPr id="4" name="Slide Number Placeholder 3"/>
+          <p:cNvSpPr>
+            <a:spLocks noGrp="1"/>
+          </p:cNvSpPr>
+          <p:nvPr>
+            <p:ph type="sldNum" sz="quarter" idx="10"/>
+          </p:nvPr>
+        </p:nvSpPr>
+        <p:spPr/>
+        <p:txBody>
+          <a:bodyPr/>
+          <a:lstStyle/>
+          <a:p>
+            <a:fld id="{6DA1C151-7BA6-414C-92F9-7F76D13D16A9}" type="slidenum">
+              <a:rPr lang="en-US" smtClean="0"/>
+              <a:t>13</a:t>
+            </a:fld>
+            <a:endParaRPr lang="en-US"/>
+          </a:p>
+        </p:txBody>
+      </p:sp>
+    </p:spTree>
+    <p:extLst>
+      <p:ext uri="{BB962C8B-B14F-4D97-AF65-F5344CB8AC3E}">
+        <p14:creationId xmlns:p14="http://schemas.microsoft.com/office/powerpoint/2010/main" val="306973168"/>
+      </p:ext>
+    </p:extLst>
+  </p:cSld>
+  <p:clrMapOvr>
+    <a:masterClrMapping/>
+  </p:clrMapOvr>
+</p:notes>
 </file>
 
 <file path=ppt/slideLayouts/slideLayout1.xml><?xml version="1.0" encoding="utf-8"?>
@@ -248,7 +708,7 @@
           <a:p>
             <a:fld id="{9EEE44CF-7EAD-4F6D-B316-9F24458BD70D}" type="datetimeFigureOut">
               <a:rPr lang="en-US" smtClean="0"/>
-              <a:t>4/16/2019</a:t>
+              <a:t>4/18/2019</a:t>
             </a:fld>
             <a:endParaRPr lang="en-US"/>
           </a:p>
@@ -425,7 +885,7 @@
           <a:p>
             <a:fld id="{9EEE44CF-7EAD-4F6D-B316-9F24458BD70D}" type="datetimeFigureOut">
               <a:rPr lang="en-US" smtClean="0"/>
-              <a:t>4/16/2019</a:t>
+              <a:t>4/18/2019</a:t>
             </a:fld>
             <a:endParaRPr lang="en-US"/>
           </a:p>
@@ -605,7 +1065,7 @@
           <a:p>
             <a:fld id="{9EEE44CF-7EAD-4F6D-B316-9F24458BD70D}" type="datetimeFigureOut">
               <a:rPr lang="en-US" smtClean="0"/>
-              <a:t>4/16/2019</a:t>
+              <a:t>4/18/2019</a:t>
             </a:fld>
             <a:endParaRPr lang="en-US"/>
           </a:p>
@@ -786,7 +1246,7 @@
           <a:p>
             <a:fld id="{9EEE44CF-7EAD-4F6D-B316-9F24458BD70D}" type="datetimeFigureOut">
               <a:rPr lang="en-US" smtClean="0"/>
-              <a:t>4/16/2019</a:t>
+              <a:t>4/18/2019</a:t>
             </a:fld>
             <a:endParaRPr lang="en-US"/>
           </a:p>
@@ -1039,7 +1499,7 @@
           <a:p>
             <a:fld id="{9EEE44CF-7EAD-4F6D-B316-9F24458BD70D}" type="datetimeFigureOut">
               <a:rPr lang="en-US" smtClean="0"/>
-              <a:t>4/16/2019</a:t>
+              <a:t>4/18/2019</a:t>
             </a:fld>
             <a:endParaRPr lang="en-US"/>
           </a:p>
@@ -1271,7 +1731,7 @@
           <a:p>
             <a:fld id="{9EEE44CF-7EAD-4F6D-B316-9F24458BD70D}" type="datetimeFigureOut">
               <a:rPr lang="en-US" smtClean="0"/>
-              <a:t>4/16/2019</a:t>
+              <a:t>4/18/2019</a:t>
             </a:fld>
             <a:endParaRPr lang="en-US"/>
           </a:p>
@@ -1638,7 +2098,7 @@
           <a:p>
             <a:fld id="{9EEE44CF-7EAD-4F6D-B316-9F24458BD70D}" type="datetimeFigureOut">
               <a:rPr lang="en-US" smtClean="0"/>
-              <a:t>4/16/2019</a:t>
+              <a:t>4/18/2019</a:t>
             </a:fld>
             <a:endParaRPr lang="en-US"/>
           </a:p>
@@ -1756,7 +2216,7 @@
           <a:p>
             <a:fld id="{9EEE44CF-7EAD-4F6D-B316-9F24458BD70D}" type="datetimeFigureOut">
               <a:rPr lang="en-US" smtClean="0"/>
-              <a:t>4/16/2019</a:t>
+              <a:t>4/18/2019</a:t>
             </a:fld>
             <a:endParaRPr lang="en-US"/>
           </a:p>
@@ -1851,7 +2311,7 @@
           <a:p>
             <a:fld id="{9EEE44CF-7EAD-4F6D-B316-9F24458BD70D}" type="datetimeFigureOut">
               <a:rPr lang="en-US" smtClean="0"/>
-              <a:t>4/16/2019</a:t>
+              <a:t>4/18/2019</a:t>
             </a:fld>
             <a:endParaRPr lang="en-US"/>
           </a:p>
@@ -2128,7 +2588,7 @@
           <a:p>
             <a:fld id="{9EEE44CF-7EAD-4F6D-B316-9F24458BD70D}" type="datetimeFigureOut">
               <a:rPr lang="en-US" smtClean="0"/>
-              <a:t>4/16/2019</a:t>
+              <a:t>4/18/2019</a:t>
             </a:fld>
             <a:endParaRPr lang="en-US"/>
           </a:p>
@@ -2381,7 +2841,7 @@
           <a:p>
             <a:fld id="{9EEE44CF-7EAD-4F6D-B316-9F24458BD70D}" type="datetimeFigureOut">
               <a:rPr lang="en-US" smtClean="0"/>
-              <a:t>4/16/2019</a:t>
+              <a:t>4/18/2019</a:t>
             </a:fld>
             <a:endParaRPr lang="en-US"/>
           </a:p>
@@ -2594,7 +3054,7 @@
           <a:p>
             <a:fld id="{9EEE44CF-7EAD-4F6D-B316-9F24458BD70D}" type="datetimeFigureOut">
               <a:rPr lang="en-US" smtClean="0"/>
-              <a:t>4/16/2019</a:t>
+              <a:t>4/18/2019</a:t>
             </a:fld>
             <a:endParaRPr lang="en-US"/>
           </a:p>
@@ -3067,7 +3527,7 @@
 </p:sld>
 </file>
 
-<file path=ppt/slides/slide2.xml><?xml version="1.0" encoding="utf-8"?>
+<file path=ppt/slides/slide10.xml><?xml version="1.0" encoding="utf-8"?>
 <p:sld xmlns:a="http://schemas.openxmlformats.org/drawingml/2006/main" xmlns:r="http://schemas.openxmlformats.org/officeDocument/2006/relationships" xmlns:p="http://schemas.openxmlformats.org/presentationml/2006/main">
   <p:cSld>
     <p:spTree>
@@ -3086,150 +3546,66 @@
       </p:grpSpPr>
       <p:sp>
         <p:nvSpPr>
-          <p:cNvPr id="3" name="Content Placeholder 2"/>
-          <p:cNvSpPr>
-            <a:spLocks noGrp="1"/>
-          </p:cNvSpPr>
+          <p:cNvPr id="2" name="Title 1"/>
+          <p:cNvSpPr>
+            <a:spLocks noGrp="1"/>
+          </p:cNvSpPr>
+          <p:nvPr>
+            <p:ph type="title"/>
+          </p:nvPr>
+        </p:nvSpPr>
+        <p:spPr/>
+        <p:txBody>
+          <a:bodyPr/>
+          <a:lstStyle/>
+          <a:p>
+            <a:endParaRPr lang="en-US"/>
+          </a:p>
+        </p:txBody>
+      </p:sp>
+      <p:pic>
+        <p:nvPicPr>
+          <p:cNvPr id="4" name="Content Placeholder 3"/>
+          <p:cNvPicPr>
+            <a:picLocks noGrp="1" noChangeAspect="1"/>
+          </p:cNvPicPr>
           <p:nvPr>
             <p:ph idx="1"/>
           </p:nvPr>
-        </p:nvSpPr>
+        </p:nvPicPr>
+        <p:blipFill>
+          <a:blip r:embed="rId2" cstate="print">
+            <a:extLst>
+              <a:ext uri="{28A0092B-C50C-407E-A947-70E740481C1C}">
+                <a14:useLocalDpi xmlns:a14="http://schemas.microsoft.com/office/drawing/2010/main" val="0"/>
+              </a:ext>
+            </a:extLst>
+          </a:blip>
+          <a:stretch>
+            <a:fillRect/>
+          </a:stretch>
+        </p:blipFill>
         <p:spPr>
           <a:xfrm>
-            <a:off x="782216" y="1181812"/>
-            <a:ext cx="10515600" cy="4556514"/>
+            <a:off x="485726" y="0"/>
+            <a:ext cx="11220549" cy="6858000"/>
           </a:xfrm>
         </p:spPr>
-        <p:txBody>
-          <a:bodyPr>
-            <a:normAutofit fontScale="85000" lnSpcReduction="10000"/>
-          </a:bodyPr>
-          <a:lstStyle/>
-          <a:p>
-            <a:r>
-              <a:rPr lang="en-US" dirty="0" smtClean="0"/>
-              <a:t>Three fitting conditions</a:t>
-            </a:r>
-          </a:p>
-          <a:p>
-            <a:pPr lvl="1"/>
-            <a:r>
-              <a:rPr lang="en-US" dirty="0" smtClean="0"/>
-              <a:t>Unity judgement task (number of saccades)</a:t>
-            </a:r>
-          </a:p>
-          <a:p>
-            <a:pPr lvl="1"/>
-            <a:r>
-              <a:rPr lang="en-US" dirty="0" smtClean="0"/>
-              <a:t>Localization task (location of A and V saccades, if one saccade A = V )</a:t>
-            </a:r>
-          </a:p>
-          <a:p>
-            <a:pPr lvl="1"/>
-            <a:r>
-              <a:rPr lang="en-US" dirty="0" smtClean="0"/>
-              <a:t>Joint task (maximize sum of log likelihood of both tasks using same parameter values)</a:t>
-            </a:r>
-          </a:p>
-          <a:p>
-            <a:pPr lvl="1"/>
-            <a:endParaRPr lang="en-US" dirty="0" smtClean="0"/>
-          </a:p>
-          <a:p>
-            <a:r>
-              <a:rPr lang="en-US" dirty="0" smtClean="0"/>
-              <a:t>For joint fit, paired Bayesian unity judgement with 3 possible localization strategies </a:t>
-            </a:r>
-          </a:p>
-          <a:p>
-            <a:pPr lvl="1"/>
-            <a:r>
-              <a:rPr lang="en-US" dirty="0" smtClean="0"/>
-              <a:t>Bayesian reweighting (using posterior probability from unity judgement)</a:t>
-            </a:r>
-          </a:p>
-          <a:p>
-            <a:pPr lvl="1"/>
-            <a:r>
-              <a:rPr lang="en-US" dirty="0" smtClean="0"/>
-              <a:t>Model selection (pick most likely case using posterior probability)</a:t>
-            </a:r>
-          </a:p>
-          <a:p>
-            <a:pPr lvl="1"/>
-            <a:r>
-              <a:rPr lang="en-US" dirty="0" smtClean="0"/>
-              <a:t>Probabilistic fusion - null (randomly choose with fixed probability = prior common</a:t>
-            </a:r>
-            <a:r>
-              <a:rPr lang="en-US" dirty="0" smtClean="0"/>
-              <a:t>)</a:t>
-            </a:r>
-            <a:endParaRPr lang="en-US" dirty="0"/>
-          </a:p>
-          <a:p>
-            <a:endParaRPr lang="en-US" dirty="0"/>
-          </a:p>
-          <a:p>
-            <a:r>
-              <a:rPr lang="en-US" dirty="0" smtClean="0"/>
-              <a:t>Binning saccade locations in 1 degree bins</a:t>
-            </a:r>
-          </a:p>
-          <a:p>
-            <a:r>
-              <a:rPr lang="en-US" dirty="0"/>
-              <a:t>N</a:t>
-            </a:r>
-            <a:r>
-              <a:rPr lang="en-US" dirty="0" smtClean="0"/>
-              <a:t>umerically integrating from -60 to +60 for each condition </a:t>
-            </a:r>
-            <a:endParaRPr lang="en-US" dirty="0" smtClean="0"/>
-          </a:p>
-        </p:txBody>
-      </p:sp>
-      <p:sp>
-        <p:nvSpPr>
-          <p:cNvPr id="8" name="Title 7"/>
-          <p:cNvSpPr>
-            <a:spLocks noGrp="1"/>
-          </p:cNvSpPr>
-          <p:nvPr>
-            <p:ph type="title"/>
-          </p:nvPr>
-        </p:nvSpPr>
-        <p:spPr/>
-        <p:txBody>
-          <a:bodyPr/>
-          <a:lstStyle/>
-          <a:p>
-            <a:endParaRPr lang="en-US"/>
-          </a:p>
-        </p:txBody>
-      </p:sp>
+      </p:pic>
     </p:spTree>
     <p:extLst>
       <p:ext uri="{BB962C8B-B14F-4D97-AF65-F5344CB8AC3E}">
-        <p14:creationId xmlns:p14="http://schemas.microsoft.com/office/powerpoint/2010/main" val="792167339"/>
+        <p14:creationId xmlns:p14="http://schemas.microsoft.com/office/powerpoint/2010/main" val="817227442"/>
       </p:ext>
     </p:extLst>
   </p:cSld>
   <p:clrMapOvr>
     <a:masterClrMapping/>
   </p:clrMapOvr>
-  <p:timing>
-    <p:tnLst>
-      <p:par>
-        <p:cTn id="1" dur="indefinite" restart="never" nodeType="tmRoot"/>
-      </p:par>
-    </p:tnLst>
-  </p:timing>
 </p:sld>
 </file>
 
-<file path=ppt/slides/slide3.xml><?xml version="1.0" encoding="utf-8"?>
+<file path=ppt/slides/slide11.xml><?xml version="1.0" encoding="utf-8"?>
 <p:sld xmlns:a="http://schemas.openxmlformats.org/drawingml/2006/main" xmlns:r="http://schemas.openxmlformats.org/officeDocument/2006/relationships" xmlns:p="http://schemas.openxmlformats.org/presentationml/2006/main">
   <p:cSld>
     <p:spTree>
@@ -3246,66 +3622,6 @@
           <a:chExt cx="0" cy="0"/>
         </a:xfrm>
       </p:grpSpPr>
-      <p:pic>
-        <p:nvPicPr>
-          <p:cNvPr id="11" name="Picture 10"/>
-          <p:cNvPicPr>
-            <a:picLocks noChangeAspect="1"/>
-          </p:cNvPicPr>
-          <p:nvPr/>
-        </p:nvPicPr>
-        <p:blipFill>
-          <a:blip r:embed="rId2">
-            <a:extLst>
-              <a:ext uri="{28A0092B-C50C-407E-A947-70E740481C1C}">
-                <a14:useLocalDpi xmlns:a14="http://schemas.microsoft.com/office/drawing/2010/main" val="0"/>
-              </a:ext>
-            </a:extLst>
-          </a:blip>
-          <a:stretch>
-            <a:fillRect/>
-          </a:stretch>
-        </p:blipFill>
-        <p:spPr>
-          <a:xfrm>
-            <a:off x="335902" y="992964"/>
-            <a:ext cx="3963911" cy="2971800"/>
-          </a:xfrm>
-          <a:prstGeom prst="rect">
-            <a:avLst/>
-          </a:prstGeom>
-        </p:spPr>
-      </p:pic>
-      <p:pic>
-        <p:nvPicPr>
-          <p:cNvPr id="8" name="Picture 7"/>
-          <p:cNvPicPr>
-            <a:picLocks noChangeAspect="1"/>
-          </p:cNvPicPr>
-          <p:nvPr/>
-        </p:nvPicPr>
-        <p:blipFill>
-          <a:blip r:embed="rId3">
-            <a:extLst>
-              <a:ext uri="{28A0092B-C50C-407E-A947-70E740481C1C}">
-                <a14:useLocalDpi xmlns:a14="http://schemas.microsoft.com/office/drawing/2010/main" val="0"/>
-              </a:ext>
-            </a:extLst>
-          </a:blip>
-          <a:stretch>
-            <a:fillRect/>
-          </a:stretch>
-        </p:blipFill>
-        <p:spPr>
-          <a:xfrm>
-            <a:off x="4026470" y="1007305"/>
-            <a:ext cx="3963911" cy="2971800"/>
-          </a:xfrm>
-          <a:prstGeom prst="rect">
-            <a:avLst/>
-          </a:prstGeom>
-        </p:spPr>
-      </p:pic>
       <p:sp>
         <p:nvSpPr>
           <p:cNvPr id="2" name="Title 1"/>
@@ -3318,839 +3634,20 @@
         </p:nvSpPr>
         <p:spPr/>
         <p:txBody>
-          <a:bodyPr>
-            <a:normAutofit fontScale="90000"/>
-          </a:bodyPr>
+          <a:bodyPr/>
           <a:lstStyle/>
           <a:p>
             <a:r>
               <a:rPr lang="en-US" dirty="0" smtClean="0"/>
-              <a:t>Unity judgement - human</a:t>
-            </a:r>
-            <a:endParaRPr lang="en-US" dirty="0"/>
-          </a:p>
-        </p:txBody>
-      </p:sp>
-      <p:pic>
-        <p:nvPicPr>
-          <p:cNvPr id="4" name="Content Placeholder 3"/>
-          <p:cNvPicPr>
-            <a:picLocks noGrp="1" noChangeAspect="1"/>
-          </p:cNvPicPr>
-          <p:nvPr>
-            <p:ph idx="1"/>
-          </p:nvPr>
-        </p:nvPicPr>
-        <p:blipFill>
-          <a:blip r:embed="rId4">
-            <a:extLst>
-              <a:ext uri="{28A0092B-C50C-407E-A947-70E740481C1C}">
-                <a14:useLocalDpi xmlns:a14="http://schemas.microsoft.com/office/drawing/2010/main" val="0"/>
-              </a:ext>
-            </a:extLst>
-          </a:blip>
-          <a:stretch>
-            <a:fillRect/>
-          </a:stretch>
-        </p:blipFill>
-        <p:spPr>
-          <a:xfrm>
-            <a:off x="7940352" y="990166"/>
-            <a:ext cx="3963912" cy="2971800"/>
-          </a:xfrm>
-        </p:spPr>
-      </p:pic>
-      <p:pic>
-        <p:nvPicPr>
-          <p:cNvPr id="5" name="Picture 4"/>
-          <p:cNvPicPr>
-            <a:picLocks noChangeAspect="1"/>
-          </p:cNvPicPr>
-          <p:nvPr/>
-        </p:nvPicPr>
-        <p:blipFill>
-          <a:blip r:embed="rId5">
-            <a:extLst>
-              <a:ext uri="{28A0092B-C50C-407E-A947-70E740481C1C}">
-                <a14:useLocalDpi xmlns:a14="http://schemas.microsoft.com/office/drawing/2010/main" val="0"/>
-              </a:ext>
-            </a:extLst>
-          </a:blip>
-          <a:stretch>
-            <a:fillRect/>
-          </a:stretch>
-        </p:blipFill>
-        <p:spPr>
-          <a:xfrm>
-            <a:off x="7940352" y="3798682"/>
-            <a:ext cx="3963912" cy="2971800"/>
-          </a:xfrm>
-          <a:prstGeom prst="rect">
-            <a:avLst/>
-          </a:prstGeom>
-        </p:spPr>
-      </p:pic>
-      <p:sp>
-        <p:nvSpPr>
-          <p:cNvPr id="6" name="TextBox 5"/>
-          <p:cNvSpPr txBox="1"/>
-          <p:nvPr/>
-        </p:nvSpPr>
-        <p:spPr>
-          <a:xfrm>
-            <a:off x="9227975" y="559838"/>
-            <a:ext cx="1934825" cy="369332"/>
-          </a:xfrm>
-          <a:prstGeom prst="rect">
-            <a:avLst/>
-          </a:prstGeom>
-          <a:noFill/>
-        </p:spPr>
-        <p:txBody>
-          <a:bodyPr wrap="none" rtlCol="0">
-            <a:spAutoFit/>
-          </a:bodyPr>
-          <a:lstStyle/>
-          <a:p>
+              <a:t>Model </a:t>
+            </a:r>
             <a:r>
               <a:rPr lang="en-US" dirty="0" smtClean="0"/>
-              <a:t>Bayes - Bayes Joint</a:t>
-            </a:r>
-            <a:endParaRPr lang="en-US" dirty="0"/>
-          </a:p>
-        </p:txBody>
-      </p:sp>
-      <p:pic>
-        <p:nvPicPr>
-          <p:cNvPr id="7" name="Picture 6"/>
-          <p:cNvPicPr>
-            <a:picLocks noChangeAspect="1"/>
-          </p:cNvPicPr>
-          <p:nvPr/>
-        </p:nvPicPr>
-        <p:blipFill>
-          <a:blip r:embed="rId6">
-            <a:extLst>
-              <a:ext uri="{28A0092B-C50C-407E-A947-70E740481C1C}">
-                <a14:useLocalDpi xmlns:a14="http://schemas.microsoft.com/office/drawing/2010/main" val="0"/>
-              </a:ext>
-            </a:extLst>
-          </a:blip>
-          <a:stretch>
-            <a:fillRect/>
-          </a:stretch>
-        </p:blipFill>
-        <p:spPr>
-          <a:xfrm>
-            <a:off x="4026470" y="3801480"/>
-            <a:ext cx="3963910" cy="2971800"/>
-          </a:xfrm>
-          <a:prstGeom prst="rect">
-            <a:avLst/>
-          </a:prstGeom>
-        </p:spPr>
-      </p:pic>
-      <p:sp>
-        <p:nvSpPr>
-          <p:cNvPr id="9" name="TextBox 8"/>
-          <p:cNvSpPr txBox="1"/>
-          <p:nvPr/>
-        </p:nvSpPr>
-        <p:spPr>
-          <a:xfrm>
-            <a:off x="5321559" y="559838"/>
-            <a:ext cx="1564146" cy="369332"/>
-          </a:xfrm>
-          <a:prstGeom prst="rect">
-            <a:avLst/>
-          </a:prstGeom>
-          <a:noFill/>
-        </p:spPr>
-        <p:txBody>
-          <a:bodyPr wrap="none" rtlCol="0">
-            <a:spAutoFit/>
-          </a:bodyPr>
-          <a:lstStyle/>
-          <a:p>
+              <a:t>comparison</a:t>
+            </a:r>
             <a:r>
               <a:rPr lang="en-US" dirty="0" smtClean="0"/>
-              <a:t>Bayesian Unity</a:t>
-            </a:r>
-            <a:endParaRPr lang="en-US" dirty="0"/>
-          </a:p>
-        </p:txBody>
-      </p:sp>
-      <p:pic>
-        <p:nvPicPr>
-          <p:cNvPr id="10" name="Picture 9"/>
-          <p:cNvPicPr>
-            <a:picLocks noChangeAspect="1"/>
-          </p:cNvPicPr>
-          <p:nvPr/>
-        </p:nvPicPr>
-        <p:blipFill>
-          <a:blip r:embed="rId7">
-            <a:extLst>
-              <a:ext uri="{28A0092B-C50C-407E-A947-70E740481C1C}">
-                <a14:useLocalDpi xmlns:a14="http://schemas.microsoft.com/office/drawing/2010/main" val="0"/>
-              </a:ext>
-            </a:extLst>
-          </a:blip>
-          <a:stretch>
-            <a:fillRect/>
-          </a:stretch>
-        </p:blipFill>
-        <p:spPr>
-          <a:xfrm>
-            <a:off x="327093" y="3798682"/>
-            <a:ext cx="3963911" cy="2971800"/>
-          </a:xfrm>
-          <a:prstGeom prst="rect">
-            <a:avLst/>
-          </a:prstGeom>
-        </p:spPr>
-      </p:pic>
-      <p:sp>
-        <p:nvSpPr>
-          <p:cNvPr id="12" name="TextBox 11"/>
-          <p:cNvSpPr txBox="1"/>
-          <p:nvPr/>
-        </p:nvSpPr>
-        <p:spPr>
-          <a:xfrm>
-            <a:off x="1502582" y="609291"/>
-            <a:ext cx="1996187" cy="369332"/>
-          </a:xfrm>
-          <a:prstGeom prst="rect">
-            <a:avLst/>
-          </a:prstGeom>
-          <a:noFill/>
-        </p:spPr>
-        <p:txBody>
-          <a:bodyPr wrap="none" rtlCol="0">
-            <a:spAutoFit/>
-          </a:bodyPr>
-          <a:lstStyle/>
-          <a:p>
-            <a:r>
-              <a:rPr lang="en-US" dirty="0" smtClean="0"/>
-              <a:t>Probabilistic Fusion</a:t>
-            </a:r>
-            <a:endParaRPr lang="en-US" dirty="0"/>
-          </a:p>
-        </p:txBody>
-      </p:sp>
-    </p:spTree>
-    <p:extLst>
-      <p:ext uri="{BB962C8B-B14F-4D97-AF65-F5344CB8AC3E}">
-        <p14:creationId xmlns:p14="http://schemas.microsoft.com/office/powerpoint/2010/main" val="2563030482"/>
-      </p:ext>
-    </p:extLst>
-  </p:cSld>
-  <p:clrMapOvr>
-    <a:masterClrMapping/>
-  </p:clrMapOvr>
-  <p:timing>
-    <p:tnLst>
-      <p:par>
-        <p:cTn id="1" dur="indefinite" restart="never" nodeType="tmRoot"/>
-      </p:par>
-    </p:tnLst>
-  </p:timing>
-</p:sld>
-</file>
-
-<file path=ppt/slides/slide4.xml><?xml version="1.0" encoding="utf-8"?>
-<p:sld xmlns:a="http://schemas.openxmlformats.org/drawingml/2006/main" xmlns:r="http://schemas.openxmlformats.org/officeDocument/2006/relationships" xmlns:p="http://schemas.openxmlformats.org/presentationml/2006/main">
-  <p:cSld>
-    <p:spTree>
-      <p:nvGrpSpPr>
-        <p:cNvPr id="1" name=""/>
-        <p:cNvGrpSpPr/>
-        <p:nvPr/>
-      </p:nvGrpSpPr>
-      <p:grpSpPr>
-        <a:xfrm>
-          <a:off x="0" y="0"/>
-          <a:ext cx="0" cy="0"/>
-          <a:chOff x="0" y="0"/>
-          <a:chExt cx="0" cy="0"/>
-        </a:xfrm>
-      </p:grpSpPr>
-      <p:pic>
-        <p:nvPicPr>
-          <p:cNvPr id="7" name="Picture 6"/>
-          <p:cNvPicPr>
-            <a:picLocks noChangeAspect="1"/>
-          </p:cNvPicPr>
-          <p:nvPr/>
-        </p:nvPicPr>
-        <p:blipFill>
-          <a:blip r:embed="rId2">
-            <a:extLst>
-              <a:ext uri="{28A0092B-C50C-407E-A947-70E740481C1C}">
-                <a14:useLocalDpi xmlns:a14="http://schemas.microsoft.com/office/drawing/2010/main" val="0"/>
-              </a:ext>
-            </a:extLst>
-          </a:blip>
-          <a:stretch>
-            <a:fillRect/>
-          </a:stretch>
-        </p:blipFill>
-        <p:spPr>
-          <a:xfrm>
-            <a:off x="4091698" y="868496"/>
-            <a:ext cx="3963910" cy="2971800"/>
-          </a:xfrm>
-          <a:prstGeom prst="rect">
-            <a:avLst/>
-          </a:prstGeom>
-        </p:spPr>
-      </p:pic>
-      <p:sp>
-        <p:nvSpPr>
-          <p:cNvPr id="2" name="Title 1"/>
-          <p:cNvSpPr>
-            <a:spLocks noGrp="1"/>
-          </p:cNvSpPr>
-          <p:nvPr>
-            <p:ph type="title"/>
-          </p:nvPr>
-        </p:nvSpPr>
-        <p:spPr>
-          <a:xfrm>
-            <a:off x="390331" y="243828"/>
-            <a:ext cx="4135016" cy="353332"/>
-          </a:xfrm>
-        </p:spPr>
-        <p:txBody>
-          <a:bodyPr/>
-          <a:lstStyle/>
-          <a:p>
-            <a:r>
-              <a:rPr lang="en-US" dirty="0" smtClean="0"/>
-              <a:t>Unity Judgement - monkey</a:t>
-            </a:r>
-            <a:endParaRPr lang="en-US" dirty="0"/>
-          </a:p>
-        </p:txBody>
-      </p:sp>
-      <p:pic>
-        <p:nvPicPr>
-          <p:cNvPr id="4" name="Picture 3"/>
-          <p:cNvPicPr>
-            <a:picLocks noChangeAspect="1"/>
-          </p:cNvPicPr>
-          <p:nvPr/>
-        </p:nvPicPr>
-        <p:blipFill>
-          <a:blip r:embed="rId3">
-            <a:extLst>
-              <a:ext uri="{28A0092B-C50C-407E-A947-70E740481C1C}">
-                <a14:useLocalDpi xmlns:a14="http://schemas.microsoft.com/office/drawing/2010/main" val="0"/>
-              </a:ext>
-            </a:extLst>
-          </a:blip>
-          <a:stretch>
-            <a:fillRect/>
-          </a:stretch>
-        </p:blipFill>
-        <p:spPr>
-          <a:xfrm>
-            <a:off x="8019882" y="905072"/>
-            <a:ext cx="3915124" cy="2935224"/>
-          </a:xfrm>
-          <a:prstGeom prst="rect">
-            <a:avLst/>
-          </a:prstGeom>
-        </p:spPr>
-      </p:pic>
-      <p:pic>
-        <p:nvPicPr>
-          <p:cNvPr id="5" name="Picture 4"/>
-          <p:cNvPicPr>
-            <a:picLocks noChangeAspect="1"/>
-          </p:cNvPicPr>
-          <p:nvPr/>
-        </p:nvPicPr>
-        <p:blipFill>
-          <a:blip r:embed="rId4">
-            <a:extLst>
-              <a:ext uri="{28A0092B-C50C-407E-A947-70E740481C1C}">
-                <a14:useLocalDpi xmlns:a14="http://schemas.microsoft.com/office/drawing/2010/main" val="0"/>
-              </a:ext>
-            </a:extLst>
-          </a:blip>
-          <a:stretch>
-            <a:fillRect/>
-          </a:stretch>
-        </p:blipFill>
-        <p:spPr>
-          <a:xfrm>
-            <a:off x="8019882" y="3690260"/>
-            <a:ext cx="3915124" cy="2935224"/>
-          </a:xfrm>
-          <a:prstGeom prst="rect">
-            <a:avLst/>
-          </a:prstGeom>
-        </p:spPr>
-      </p:pic>
-      <p:pic>
-        <p:nvPicPr>
-          <p:cNvPr id="6" name="Picture 5"/>
-          <p:cNvPicPr>
-            <a:picLocks noChangeAspect="1"/>
-          </p:cNvPicPr>
-          <p:nvPr/>
-        </p:nvPicPr>
-        <p:blipFill>
-          <a:blip r:embed="rId5">
-            <a:extLst>
-              <a:ext uri="{28A0092B-C50C-407E-A947-70E740481C1C}">
-                <a14:useLocalDpi xmlns:a14="http://schemas.microsoft.com/office/drawing/2010/main" val="0"/>
-              </a:ext>
-            </a:extLst>
-          </a:blip>
-          <a:stretch>
-            <a:fillRect/>
-          </a:stretch>
-        </p:blipFill>
-        <p:spPr>
-          <a:xfrm>
-            <a:off x="4091698" y="3653684"/>
-            <a:ext cx="3963910" cy="2971800"/>
-          </a:xfrm>
-          <a:prstGeom prst="rect">
-            <a:avLst/>
-          </a:prstGeom>
-        </p:spPr>
-      </p:pic>
-      <p:sp>
-        <p:nvSpPr>
-          <p:cNvPr id="8" name="TextBox 7"/>
-          <p:cNvSpPr txBox="1"/>
-          <p:nvPr/>
-        </p:nvSpPr>
-        <p:spPr>
-          <a:xfrm>
-            <a:off x="606490" y="2647566"/>
-            <a:ext cx="3485208" cy="2862322"/>
-          </a:xfrm>
-          <a:prstGeom prst="rect">
-            <a:avLst/>
-          </a:prstGeom>
-          <a:noFill/>
-        </p:spPr>
-        <p:txBody>
-          <a:bodyPr wrap="square" rtlCol="0">
-            <a:spAutoFit/>
-          </a:bodyPr>
-          <a:lstStyle/>
-          <a:p>
-            <a:pPr marL="285750" indent="-285750">
-              <a:buFont typeface="Arial" panose="020B0604020202020204" pitchFamily="34" charset="0"/>
-              <a:buChar char="•"/>
-            </a:pPr>
-            <a:r>
-              <a:rPr lang="en-US" dirty="0" smtClean="0"/>
-              <a:t>Data collapsed across 10 randomly selected days</a:t>
-            </a:r>
-          </a:p>
-          <a:p>
-            <a:pPr marL="285750" indent="-285750">
-              <a:buFont typeface="Arial" panose="020B0604020202020204" pitchFamily="34" charset="0"/>
-              <a:buChar char="•"/>
-            </a:pPr>
-            <a:endParaRPr lang="en-US" dirty="0" smtClean="0"/>
-          </a:p>
-          <a:p>
-            <a:pPr marL="285750" indent="-285750">
-              <a:buFont typeface="Arial" panose="020B0604020202020204" pitchFamily="34" charset="0"/>
-              <a:buChar char="•"/>
-            </a:pPr>
-            <a:r>
-              <a:rPr lang="en-US" dirty="0" smtClean="0"/>
-              <a:t>Monkey Y has a stereotyped behavior on -6A -6V that includes a mostly vertical saccade. Deciding if I want to discard this.</a:t>
-            </a:r>
-          </a:p>
-          <a:p>
-            <a:pPr marL="285750" indent="-285750">
-              <a:buFont typeface="Arial" panose="020B0604020202020204" pitchFamily="34" charset="0"/>
-              <a:buChar char="•"/>
-            </a:pPr>
-            <a:endParaRPr lang="en-US" dirty="0" smtClean="0"/>
-          </a:p>
-          <a:p>
-            <a:endParaRPr lang="en-US" dirty="0"/>
-          </a:p>
-        </p:txBody>
-      </p:sp>
-      <p:sp>
-        <p:nvSpPr>
-          <p:cNvPr id="10" name="TextBox 9"/>
-          <p:cNvSpPr txBox="1"/>
-          <p:nvPr/>
-        </p:nvSpPr>
-        <p:spPr>
-          <a:xfrm>
-            <a:off x="7065753" y="238718"/>
-            <a:ext cx="1979709" cy="369332"/>
-          </a:xfrm>
-          <a:prstGeom prst="rect">
-            <a:avLst/>
-          </a:prstGeom>
-          <a:noFill/>
-        </p:spPr>
-        <p:txBody>
-          <a:bodyPr wrap="none" rtlCol="0">
-            <a:spAutoFit/>
-          </a:bodyPr>
-          <a:lstStyle/>
-          <a:p>
-            <a:r>
-              <a:rPr lang="en-US" dirty="0" smtClean="0"/>
-              <a:t>Bayes – Bayes Joint</a:t>
-            </a:r>
-            <a:endParaRPr lang="en-US" dirty="0"/>
-          </a:p>
-        </p:txBody>
-      </p:sp>
-      <p:sp>
-        <p:nvSpPr>
-          <p:cNvPr id="11" name="TextBox 10"/>
-          <p:cNvSpPr txBox="1"/>
-          <p:nvPr/>
-        </p:nvSpPr>
-        <p:spPr>
-          <a:xfrm>
-            <a:off x="5663682" y="597160"/>
-            <a:ext cx="1067023" cy="369332"/>
-          </a:xfrm>
-          <a:prstGeom prst="rect">
-            <a:avLst/>
-          </a:prstGeom>
-          <a:noFill/>
-        </p:spPr>
-        <p:txBody>
-          <a:bodyPr wrap="none" rtlCol="0">
-            <a:spAutoFit/>
-          </a:bodyPr>
-          <a:lstStyle/>
-          <a:p>
-            <a:r>
-              <a:rPr lang="en-US" dirty="0" smtClean="0"/>
-              <a:t>Monkey J</a:t>
-            </a:r>
-            <a:endParaRPr lang="en-US" dirty="0"/>
-          </a:p>
-        </p:txBody>
-      </p:sp>
-      <p:sp>
-        <p:nvSpPr>
-          <p:cNvPr id="12" name="TextBox 11"/>
-          <p:cNvSpPr txBox="1"/>
-          <p:nvPr/>
-        </p:nvSpPr>
-        <p:spPr>
-          <a:xfrm>
-            <a:off x="9591866" y="597160"/>
-            <a:ext cx="1105495" cy="369332"/>
-          </a:xfrm>
-          <a:prstGeom prst="rect">
-            <a:avLst/>
-          </a:prstGeom>
-          <a:noFill/>
-        </p:spPr>
-        <p:txBody>
-          <a:bodyPr wrap="none" rtlCol="0">
-            <a:spAutoFit/>
-          </a:bodyPr>
-          <a:lstStyle/>
-          <a:p>
-            <a:r>
-              <a:rPr lang="en-US" dirty="0" smtClean="0"/>
-              <a:t>Monkey Y</a:t>
-            </a:r>
-            <a:endParaRPr lang="en-US" dirty="0"/>
-          </a:p>
-        </p:txBody>
-      </p:sp>
-    </p:spTree>
-    <p:extLst>
-      <p:ext uri="{BB962C8B-B14F-4D97-AF65-F5344CB8AC3E}">
-        <p14:creationId xmlns:p14="http://schemas.microsoft.com/office/powerpoint/2010/main" val="779636793"/>
-      </p:ext>
-    </p:extLst>
-  </p:cSld>
-  <p:clrMapOvr>
-    <a:masterClrMapping/>
-  </p:clrMapOvr>
-  <p:timing>
-    <p:tnLst>
-      <p:par>
-        <p:cTn id="1" dur="indefinite" restart="never" nodeType="tmRoot"/>
-      </p:par>
-    </p:tnLst>
-  </p:timing>
-</p:sld>
-</file>
-
-<file path=ppt/slides/slide5.xml><?xml version="1.0" encoding="utf-8"?>
-<p:sld xmlns:a="http://schemas.openxmlformats.org/drawingml/2006/main" xmlns:r="http://schemas.openxmlformats.org/officeDocument/2006/relationships" xmlns:p="http://schemas.openxmlformats.org/presentationml/2006/main">
-  <p:cSld>
-    <p:spTree>
-      <p:nvGrpSpPr>
-        <p:cNvPr id="1" name=""/>
-        <p:cNvGrpSpPr/>
-        <p:nvPr/>
-      </p:nvGrpSpPr>
-      <p:grpSpPr>
-        <a:xfrm>
-          <a:off x="0" y="0"/>
-          <a:ext cx="0" cy="0"/>
-          <a:chOff x="0" y="0"/>
-          <a:chExt cx="0" cy="0"/>
-        </a:xfrm>
-      </p:grpSpPr>
-      <p:sp>
-        <p:nvSpPr>
-          <p:cNvPr id="2" name="Title 1"/>
-          <p:cNvSpPr>
-            <a:spLocks noGrp="1"/>
-          </p:cNvSpPr>
-          <p:nvPr>
-            <p:ph type="title"/>
-          </p:nvPr>
-        </p:nvSpPr>
-        <p:spPr/>
-        <p:txBody>
-          <a:bodyPr/>
-          <a:lstStyle/>
-          <a:p>
-            <a:r>
-              <a:rPr lang="en-US" dirty="0" smtClean="0"/>
-              <a:t>Posterior distribution question</a:t>
-            </a:r>
-            <a:endParaRPr lang="en-US" dirty="0"/>
-          </a:p>
-        </p:txBody>
-      </p:sp>
-      <p:pic>
-        <p:nvPicPr>
-          <p:cNvPr id="1026" name="Picture 2" descr="https://lh5.googleusercontent.com/CN7rvgoLx4vL-t4ZhvRb4xKFJ9lH1kL2UC7XULAtQ0eRH0BYSGiL0cJdrd_m6Ix8wABD6pOLRXF-oJpQsPgAuFkiS6BbA_rjhXJbhbGV8WXLOW6FvJIyQbOPTEEjbPaQrAfvGM6M"/>
-          <p:cNvPicPr>
-            <a:picLocks noChangeAspect="1" noChangeArrowheads="1"/>
-          </p:cNvPicPr>
-          <p:nvPr/>
-        </p:nvPicPr>
-        <p:blipFill>
-          <a:blip r:embed="rId2">
-            <a:extLst>
-              <a:ext uri="{28A0092B-C50C-407E-A947-70E740481C1C}">
-                <a14:useLocalDpi xmlns:a14="http://schemas.microsoft.com/office/drawing/2010/main" val="0"/>
-              </a:ext>
-            </a:extLst>
-          </a:blip>
-          <a:srcRect/>
-          <a:stretch>
-            <a:fillRect/>
-          </a:stretch>
-        </p:blipFill>
-        <p:spPr bwMode="auto">
-          <a:xfrm>
-            <a:off x="390331" y="2211972"/>
-            <a:ext cx="5486400" cy="4114800"/>
-          </a:xfrm>
-          <a:prstGeom prst="rect">
-            <a:avLst/>
-          </a:prstGeom>
-          <a:noFill/>
-          <a:extLst>
-            <a:ext uri="{909E8E84-426E-40DD-AFC4-6F175D3DCCD1}">
-              <a14:hiddenFill xmlns:a14="http://schemas.microsoft.com/office/drawing/2010/main">
-                <a:solidFill>
-                  <a:srgbClr val="FFFFFF"/>
-                </a:solidFill>
-              </a14:hiddenFill>
-            </a:ext>
-          </a:extLst>
-        </p:spPr>
-      </p:pic>
-      <p:sp>
-        <p:nvSpPr>
-          <p:cNvPr id="4" name="TextBox 3"/>
-          <p:cNvSpPr txBox="1"/>
-          <p:nvPr/>
-        </p:nvSpPr>
-        <p:spPr>
-          <a:xfrm>
-            <a:off x="699341" y="970384"/>
-            <a:ext cx="10432079" cy="646331"/>
-          </a:xfrm>
-          <a:prstGeom prst="rect">
-            <a:avLst/>
-          </a:prstGeom>
-          <a:noFill/>
-        </p:spPr>
-        <p:txBody>
-          <a:bodyPr wrap="square" rtlCol="0">
-            <a:spAutoFit/>
-          </a:bodyPr>
-          <a:lstStyle/>
-          <a:p>
-            <a:r>
-              <a:rPr lang="en-US" dirty="0" smtClean="0"/>
-              <a:t>Dot on right side should be concentrated on the diagonal (because it is mostly impossible for me to get a response of like [-6A,-7V], for instance).</a:t>
-            </a:r>
-            <a:endParaRPr lang="en-US" dirty="0"/>
-          </a:p>
-        </p:txBody>
-      </p:sp>
-      <p:pic>
-        <p:nvPicPr>
-          <p:cNvPr id="5" name="Picture 4"/>
-          <p:cNvPicPr>
-            <a:picLocks noChangeAspect="1"/>
-          </p:cNvPicPr>
-          <p:nvPr/>
-        </p:nvPicPr>
-        <p:blipFill>
-          <a:blip r:embed="rId3">
-            <a:extLst>
-              <a:ext uri="{28A0092B-C50C-407E-A947-70E740481C1C}">
-                <a14:useLocalDpi xmlns:a14="http://schemas.microsoft.com/office/drawing/2010/main" val="0"/>
-              </a:ext>
-            </a:extLst>
-          </a:blip>
-          <a:stretch>
-            <a:fillRect/>
-          </a:stretch>
-        </p:blipFill>
-        <p:spPr>
-          <a:xfrm>
-            <a:off x="6143840" y="2211971"/>
-            <a:ext cx="5486399" cy="4114800"/>
-          </a:xfrm>
-          <a:prstGeom prst="rect">
-            <a:avLst/>
-          </a:prstGeom>
-        </p:spPr>
-      </p:pic>
-      <p:sp>
-        <p:nvSpPr>
-          <p:cNvPr id="6" name="TextBox 5"/>
-          <p:cNvSpPr txBox="1"/>
-          <p:nvPr/>
-        </p:nvSpPr>
-        <p:spPr>
-          <a:xfrm>
-            <a:off x="2118049" y="1931437"/>
-            <a:ext cx="2765372" cy="369332"/>
-          </a:xfrm>
-          <a:prstGeom prst="rect">
-            <a:avLst/>
-          </a:prstGeom>
-          <a:noFill/>
-        </p:spPr>
-        <p:txBody>
-          <a:bodyPr wrap="none" rtlCol="0">
-            <a:spAutoFit/>
-          </a:bodyPr>
-          <a:lstStyle/>
-          <a:p>
-            <a:r>
-              <a:rPr lang="en-US" dirty="0" smtClean="0"/>
-              <a:t>MAP estimated distribution</a:t>
-            </a:r>
-            <a:endParaRPr lang="en-US" dirty="0"/>
-          </a:p>
-        </p:txBody>
-      </p:sp>
-      <p:sp>
-        <p:nvSpPr>
-          <p:cNvPr id="8" name="TextBox 7"/>
-          <p:cNvSpPr txBox="1"/>
-          <p:nvPr/>
-        </p:nvSpPr>
-        <p:spPr>
-          <a:xfrm>
-            <a:off x="8702224" y="1931437"/>
-            <a:ext cx="620554" cy="369332"/>
-          </a:xfrm>
-          <a:prstGeom prst="rect">
-            <a:avLst/>
-          </a:prstGeom>
-          <a:noFill/>
-        </p:spPr>
-        <p:txBody>
-          <a:bodyPr wrap="none" rtlCol="0">
-            <a:spAutoFit/>
-          </a:bodyPr>
-          <a:lstStyle/>
-          <a:p>
-            <a:r>
-              <a:rPr lang="en-US" dirty="0" smtClean="0"/>
-              <a:t>Data</a:t>
-            </a:r>
-            <a:endParaRPr lang="en-US" dirty="0"/>
-          </a:p>
-        </p:txBody>
-      </p:sp>
-    </p:spTree>
-    <p:extLst>
-      <p:ext uri="{BB962C8B-B14F-4D97-AF65-F5344CB8AC3E}">
-        <p14:creationId xmlns:p14="http://schemas.microsoft.com/office/powerpoint/2010/main" val="3123868591"/>
-      </p:ext>
-    </p:extLst>
-  </p:cSld>
-  <p:clrMapOvr>
-    <a:masterClrMapping/>
-  </p:clrMapOvr>
-  <p:timing>
-    <p:tnLst>
-      <p:par>
-        <p:cTn id="1" dur="indefinite" restart="never" nodeType="tmRoot"/>
-      </p:par>
-    </p:tnLst>
-  </p:timing>
-</p:sld>
-</file>
-
-<file path=ppt/slides/slide6.xml><?xml version="1.0" encoding="utf-8"?>
-<p:sld xmlns:a="http://schemas.openxmlformats.org/drawingml/2006/main" xmlns:r="http://schemas.openxmlformats.org/officeDocument/2006/relationships" xmlns:p="http://schemas.openxmlformats.org/presentationml/2006/main">
-  <p:cSld>
-    <p:spTree>
-      <p:nvGrpSpPr>
-        <p:cNvPr id="1" name=""/>
-        <p:cNvGrpSpPr/>
-        <p:nvPr/>
-      </p:nvGrpSpPr>
-      <p:grpSpPr>
-        <a:xfrm>
-          <a:off x="0" y="0"/>
-          <a:ext cx="0" cy="0"/>
-          <a:chOff x="0" y="0"/>
-          <a:chExt cx="0" cy="0"/>
-        </a:xfrm>
-      </p:grpSpPr>
-      <p:sp>
-        <p:nvSpPr>
-          <p:cNvPr id="2" name="Title 1"/>
-          <p:cNvSpPr>
-            <a:spLocks noGrp="1"/>
-          </p:cNvSpPr>
-          <p:nvPr>
-            <p:ph type="title"/>
-          </p:nvPr>
-        </p:nvSpPr>
-        <p:spPr/>
-        <p:txBody>
-          <a:bodyPr/>
-          <a:lstStyle/>
-          <a:p>
-            <a:r>
-              <a:rPr lang="en-US" dirty="0" smtClean="0"/>
-              <a:t>Comparing Fit parameters with unimodal trials</a:t>
+              <a:t> and fit parameters</a:t>
             </a:r>
             <a:endParaRPr lang="en-US" dirty="0"/>
           </a:p>
@@ -4166,13 +3663,522 @@
             <p:ph idx="1"/>
             <p:extLst>
               <p:ext uri="{D42A27DB-BD31-4B8C-83A1-F6EECF244321}">
-                <p14:modId xmlns:p14="http://schemas.microsoft.com/office/powerpoint/2010/main" val="4012582826"/>
+                <p14:modId xmlns:p14="http://schemas.microsoft.com/office/powerpoint/2010/main" val="3471901689"/>
               </p:ext>
             </p:extLst>
           </p:nvPr>
         </p:nvGraphicFramePr>
         <p:xfrm>
-          <a:off x="1996753" y="889846"/>
+          <a:off x="2010962" y="914788"/>
+          <a:ext cx="8319365" cy="3708400"/>
+        </p:xfrm>
+        <a:graphic>
+          <a:graphicData uri="http://schemas.openxmlformats.org/drawingml/2006/table">
+            <a:tbl>
+              <a:tblPr firstRow="1" bandRow="1">
+                <a:tableStyleId>{5C22544A-7EE6-4342-B048-85BDC9FD1C3A}</a:tableStyleId>
+              </a:tblPr>
+              <a:tblGrid>
+                <a:gridCol w="1588936"/>
+                <a:gridCol w="3214688"/>
+                <a:gridCol w="3515741"/>
+              </a:tblGrid>
+              <a:tr h="370840">
+                <a:tc>
+                  <a:txBody>
+                    <a:bodyPr/>
+                    <a:lstStyle/>
+                    <a:p>
+                      <a:r>
+                        <a:rPr lang="en-US" dirty="0" smtClean="0"/>
+                        <a:t>Subject</a:t>
+                      </a:r>
+                      <a:endParaRPr lang="en-US" dirty="0"/>
+                    </a:p>
+                  </a:txBody>
+                  <a:tcPr/>
+                </a:tc>
+                <a:tc>
+                  <a:txBody>
+                    <a:bodyPr/>
+                    <a:lstStyle/>
+                    <a:p>
+                      <a:r>
+                        <a:rPr lang="en-US" dirty="0" smtClean="0"/>
+                        <a:t>Bayes BIC - Model Selection</a:t>
+                      </a:r>
+                      <a:r>
+                        <a:rPr lang="en-US" baseline="0" dirty="0" smtClean="0"/>
+                        <a:t> BIC</a:t>
+                      </a:r>
+                      <a:endParaRPr lang="en-US" dirty="0"/>
+                    </a:p>
+                  </a:txBody>
+                  <a:tcPr/>
+                </a:tc>
+                <a:tc>
+                  <a:txBody>
+                    <a:bodyPr/>
+                    <a:lstStyle/>
+                    <a:p>
+                      <a:r>
+                        <a:rPr lang="en-US" dirty="0" smtClean="0"/>
+                        <a:t>Bayes BIC - Probabilistic Fusion BIC</a:t>
+                      </a:r>
+                      <a:endParaRPr lang="en-US" dirty="0"/>
+                    </a:p>
+                  </a:txBody>
+                  <a:tcPr/>
+                </a:tc>
+              </a:tr>
+              <a:tr h="370840">
+                <a:tc>
+                  <a:txBody>
+                    <a:bodyPr/>
+                    <a:lstStyle/>
+                    <a:p>
+                      <a:r>
+                        <a:rPr lang="en-US" dirty="0" smtClean="0"/>
+                        <a:t>Monkey J</a:t>
+                      </a:r>
+                      <a:endParaRPr lang="en-US" dirty="0"/>
+                    </a:p>
+                  </a:txBody>
+                  <a:tcPr/>
+                </a:tc>
+                <a:tc>
+                  <a:txBody>
+                    <a:bodyPr/>
+                    <a:lstStyle/>
+                    <a:p>
+                      <a:pPr algn="ctr"/>
+                      <a:r>
+                        <a:rPr lang="en-US" dirty="0" smtClean="0"/>
+                        <a:t>-557.1</a:t>
+                      </a:r>
+                      <a:endParaRPr lang="en-US" dirty="0"/>
+                    </a:p>
+                  </a:txBody>
+                  <a:tcPr/>
+                </a:tc>
+                <a:tc>
+                  <a:txBody>
+                    <a:bodyPr/>
+                    <a:lstStyle/>
+                    <a:p>
+                      <a:pPr algn="ctr"/>
+                      <a:r>
+                        <a:rPr lang="en-US" dirty="0" smtClean="0"/>
+                        <a:t>-1840.7</a:t>
+                      </a:r>
+                      <a:endParaRPr lang="en-US" dirty="0"/>
+                    </a:p>
+                  </a:txBody>
+                  <a:tcPr/>
+                </a:tc>
+              </a:tr>
+              <a:tr h="370840">
+                <a:tc>
+                  <a:txBody>
+                    <a:bodyPr/>
+                    <a:lstStyle/>
+                    <a:p>
+                      <a:r>
+                        <a:rPr lang="en-US" dirty="0" smtClean="0"/>
+                        <a:t>Monkey Y</a:t>
+                      </a:r>
+                      <a:endParaRPr lang="en-US" dirty="0"/>
+                    </a:p>
+                  </a:txBody>
+                  <a:tcPr/>
+                </a:tc>
+                <a:tc>
+                  <a:txBody>
+                    <a:bodyPr/>
+                    <a:lstStyle/>
+                    <a:p>
+                      <a:pPr algn="ctr"/>
+                      <a:r>
+                        <a:rPr lang="en-US" dirty="0" smtClean="0"/>
+                        <a:t>-557.1</a:t>
+                      </a:r>
+                      <a:endParaRPr lang="en-US" dirty="0"/>
+                    </a:p>
+                  </a:txBody>
+                  <a:tcPr/>
+                </a:tc>
+                <a:tc>
+                  <a:txBody>
+                    <a:bodyPr/>
+                    <a:lstStyle/>
+                    <a:p>
+                      <a:pPr algn="ctr"/>
+                      <a:r>
+                        <a:rPr lang="en-US" dirty="0" smtClean="0"/>
+                        <a:t>-479.6</a:t>
+                      </a:r>
+                      <a:endParaRPr lang="en-US" dirty="0"/>
+                    </a:p>
+                  </a:txBody>
+                  <a:tcPr/>
+                </a:tc>
+              </a:tr>
+              <a:tr h="370840">
+                <a:tc>
+                  <a:txBody>
+                    <a:bodyPr/>
+                    <a:lstStyle/>
+                    <a:p>
+                      <a:r>
+                        <a:rPr lang="en-US" dirty="0" smtClean="0"/>
+                        <a:t>H02</a:t>
+                      </a:r>
+                      <a:endParaRPr lang="en-US" dirty="0"/>
+                    </a:p>
+                  </a:txBody>
+                  <a:tcPr/>
+                </a:tc>
+                <a:tc>
+                  <a:txBody>
+                    <a:bodyPr/>
+                    <a:lstStyle/>
+                    <a:p>
+                      <a:pPr algn="ctr"/>
+                      <a:r>
+                        <a:rPr lang="en-US" dirty="0" smtClean="0"/>
+                        <a:t>-3.7</a:t>
+                      </a:r>
+                      <a:endParaRPr lang="en-US" dirty="0"/>
+                    </a:p>
+                  </a:txBody>
+                  <a:tcPr/>
+                </a:tc>
+                <a:tc>
+                  <a:txBody>
+                    <a:bodyPr/>
+                    <a:lstStyle/>
+                    <a:p>
+                      <a:pPr marL="0" marR="0" lvl="0" indent="0" algn="ctr" defTabSz="914400" rtl="0" eaLnBrk="1" fontAlgn="auto" latinLnBrk="0" hangingPunct="1">
+                        <a:lnSpc>
+                          <a:spcPct val="100000"/>
+                        </a:lnSpc>
+                        <a:spcBef>
+                          <a:spcPts val="0"/>
+                        </a:spcBef>
+                        <a:spcAft>
+                          <a:spcPts val="0"/>
+                        </a:spcAft>
+                        <a:buClrTx/>
+                        <a:buSzTx/>
+                        <a:buFontTx/>
+                        <a:buNone/>
+                        <a:tabLst/>
+                        <a:defRPr/>
+                      </a:pPr>
+                      <a:r>
+                        <a:rPr lang="en-US" dirty="0" smtClean="0"/>
+                        <a:t>-417.4</a:t>
+                      </a:r>
+                    </a:p>
+                  </a:txBody>
+                  <a:tcPr/>
+                </a:tc>
+              </a:tr>
+              <a:tr h="370840">
+                <a:tc>
+                  <a:txBody>
+                    <a:bodyPr/>
+                    <a:lstStyle/>
+                    <a:p>
+                      <a:r>
+                        <a:rPr lang="en-US" dirty="0" smtClean="0"/>
+                        <a:t>H03</a:t>
+                      </a:r>
+                      <a:endParaRPr lang="en-US" dirty="0"/>
+                    </a:p>
+                  </a:txBody>
+                  <a:tcPr/>
+                </a:tc>
+                <a:tc>
+                  <a:txBody>
+                    <a:bodyPr/>
+                    <a:lstStyle/>
+                    <a:p>
+                      <a:pPr algn="ctr"/>
+                      <a:r>
+                        <a:rPr lang="en-US" dirty="0" smtClean="0"/>
+                        <a:t>-9.8</a:t>
+                      </a:r>
+                      <a:endParaRPr lang="en-US" dirty="0"/>
+                    </a:p>
+                  </a:txBody>
+                  <a:tcPr/>
+                </a:tc>
+                <a:tc>
+                  <a:txBody>
+                    <a:bodyPr/>
+                    <a:lstStyle/>
+                    <a:p>
+                      <a:pPr algn="ctr"/>
+                      <a:r>
+                        <a:rPr lang="en-US" dirty="0" smtClean="0"/>
+                        <a:t>-457.5</a:t>
+                      </a:r>
+                      <a:endParaRPr lang="en-US" dirty="0"/>
+                    </a:p>
+                  </a:txBody>
+                  <a:tcPr/>
+                </a:tc>
+              </a:tr>
+              <a:tr h="370840">
+                <a:tc>
+                  <a:txBody>
+                    <a:bodyPr/>
+                    <a:lstStyle/>
+                    <a:p>
+                      <a:r>
+                        <a:rPr lang="en-US" dirty="0" smtClean="0"/>
+                        <a:t>H04</a:t>
+                      </a:r>
+                    </a:p>
+                  </a:txBody>
+                  <a:tcPr/>
+                </a:tc>
+                <a:tc>
+                  <a:txBody>
+                    <a:bodyPr/>
+                    <a:lstStyle/>
+                    <a:p>
+                      <a:pPr algn="ctr"/>
+                      <a:r>
+                        <a:rPr lang="en-US" dirty="0" smtClean="0"/>
+                        <a:t>-63.8</a:t>
+                      </a:r>
+                      <a:endParaRPr lang="en-US" dirty="0"/>
+                    </a:p>
+                  </a:txBody>
+                  <a:tcPr/>
+                </a:tc>
+                <a:tc>
+                  <a:txBody>
+                    <a:bodyPr/>
+                    <a:lstStyle/>
+                    <a:p>
+                      <a:pPr algn="ctr"/>
+                      <a:r>
+                        <a:rPr lang="en-US" dirty="0" smtClean="0"/>
+                        <a:t>-471.8</a:t>
+                      </a:r>
+                      <a:endParaRPr lang="en-US" dirty="0"/>
+                    </a:p>
+                  </a:txBody>
+                  <a:tcPr/>
+                </a:tc>
+              </a:tr>
+              <a:tr h="370840">
+                <a:tc>
+                  <a:txBody>
+                    <a:bodyPr/>
+                    <a:lstStyle/>
+                    <a:p>
+                      <a:r>
+                        <a:rPr lang="en-US" dirty="0" smtClean="0"/>
+                        <a:t>H05</a:t>
+                      </a:r>
+                      <a:endParaRPr lang="en-US" dirty="0"/>
+                    </a:p>
+                  </a:txBody>
+                  <a:tcPr/>
+                </a:tc>
+                <a:tc>
+                  <a:txBody>
+                    <a:bodyPr/>
+                    <a:lstStyle/>
+                    <a:p>
+                      <a:pPr algn="ctr"/>
+                      <a:r>
+                        <a:rPr lang="en-US" dirty="0" smtClean="0"/>
+                        <a:t>-64.0</a:t>
+                      </a:r>
+                      <a:endParaRPr lang="en-US" dirty="0"/>
+                    </a:p>
+                  </a:txBody>
+                  <a:tcPr/>
+                </a:tc>
+                <a:tc>
+                  <a:txBody>
+                    <a:bodyPr/>
+                    <a:lstStyle/>
+                    <a:p>
+                      <a:pPr algn="ctr"/>
+                      <a:r>
+                        <a:rPr lang="en-US" dirty="0" smtClean="0"/>
+                        <a:t>-141.9</a:t>
+                      </a:r>
+                      <a:endParaRPr lang="en-US" dirty="0"/>
+                    </a:p>
+                  </a:txBody>
+                  <a:tcPr/>
+                </a:tc>
+              </a:tr>
+              <a:tr h="370840">
+                <a:tc>
+                  <a:txBody>
+                    <a:bodyPr/>
+                    <a:lstStyle/>
+                    <a:p>
+                      <a:r>
+                        <a:rPr lang="en-US" dirty="0" smtClean="0"/>
+                        <a:t>H06</a:t>
+                      </a:r>
+                      <a:endParaRPr lang="en-US" dirty="0"/>
+                    </a:p>
+                  </a:txBody>
+                  <a:tcPr/>
+                </a:tc>
+                <a:tc>
+                  <a:txBody>
+                    <a:bodyPr/>
+                    <a:lstStyle/>
+                    <a:p>
+                      <a:pPr algn="ctr"/>
+                      <a:r>
+                        <a:rPr lang="en-US" dirty="0" smtClean="0"/>
+                        <a:t>-30.5</a:t>
+                      </a:r>
+                      <a:endParaRPr lang="en-US" dirty="0"/>
+                    </a:p>
+                  </a:txBody>
+                  <a:tcPr/>
+                </a:tc>
+                <a:tc>
+                  <a:txBody>
+                    <a:bodyPr/>
+                    <a:lstStyle/>
+                    <a:p>
+                      <a:pPr algn="ctr"/>
+                      <a:r>
+                        <a:rPr lang="en-US" dirty="0" smtClean="0"/>
+                        <a:t>-144.8</a:t>
+                      </a:r>
+                      <a:endParaRPr lang="en-US" dirty="0"/>
+                    </a:p>
+                  </a:txBody>
+                  <a:tcPr/>
+                </a:tc>
+              </a:tr>
+              <a:tr h="370840">
+                <a:tc>
+                  <a:txBody>
+                    <a:bodyPr/>
+                    <a:lstStyle/>
+                    <a:p>
+                      <a:r>
+                        <a:rPr lang="en-US" dirty="0" smtClean="0"/>
+                        <a:t>H07</a:t>
+                      </a:r>
+                      <a:endParaRPr lang="en-US" dirty="0"/>
+                    </a:p>
+                  </a:txBody>
+                  <a:tcPr/>
+                </a:tc>
+                <a:tc>
+                  <a:txBody>
+                    <a:bodyPr/>
+                    <a:lstStyle/>
+                    <a:p>
+                      <a:pPr algn="ctr"/>
+                      <a:r>
+                        <a:rPr lang="en-US" dirty="0" smtClean="0"/>
+                        <a:t>-58.22</a:t>
+                      </a:r>
+                      <a:endParaRPr lang="en-US" dirty="0"/>
+                    </a:p>
+                  </a:txBody>
+                  <a:tcPr/>
+                </a:tc>
+                <a:tc>
+                  <a:txBody>
+                    <a:bodyPr/>
+                    <a:lstStyle/>
+                    <a:p>
+                      <a:pPr algn="ctr"/>
+                      <a:r>
+                        <a:rPr lang="en-US" dirty="0" smtClean="0"/>
+                        <a:t>-332.5</a:t>
+                      </a:r>
+                      <a:endParaRPr lang="en-US" dirty="0"/>
+                    </a:p>
+                  </a:txBody>
+                  <a:tcPr/>
+                </a:tc>
+              </a:tr>
+              <a:tr h="370840">
+                <a:tc>
+                  <a:txBody>
+                    <a:bodyPr/>
+                    <a:lstStyle/>
+                    <a:p>
+                      <a:r>
+                        <a:rPr lang="en-US" dirty="0" smtClean="0"/>
+                        <a:t>H08</a:t>
+                      </a:r>
+                      <a:endParaRPr lang="en-US" dirty="0"/>
+                    </a:p>
+                  </a:txBody>
+                  <a:tcPr/>
+                </a:tc>
+                <a:tc>
+                  <a:txBody>
+                    <a:bodyPr/>
+                    <a:lstStyle/>
+                    <a:p>
+                      <a:pPr algn="ctr"/>
+                      <a:r>
+                        <a:rPr lang="en-US" b="1" dirty="0" smtClean="0"/>
+                        <a:t>+10.2</a:t>
+                      </a:r>
+                      <a:endParaRPr lang="en-US" b="1" dirty="0"/>
+                    </a:p>
+                  </a:txBody>
+                  <a:tcPr/>
+                </a:tc>
+                <a:tc>
+                  <a:txBody>
+                    <a:bodyPr/>
+                    <a:lstStyle/>
+                    <a:p>
+                      <a:pPr algn="ctr"/>
+                      <a:r>
+                        <a:rPr lang="en-US" dirty="0" smtClean="0"/>
+                        <a:t>-423.2</a:t>
+                      </a:r>
+                      <a:endParaRPr lang="en-US" dirty="0"/>
+                    </a:p>
+                  </a:txBody>
+                  <a:tcPr/>
+                </a:tc>
+              </a:tr>
+            </a:tbl>
+          </a:graphicData>
+        </a:graphic>
+      </p:graphicFrame>
+      <p:graphicFrame>
+        <p:nvGraphicFramePr>
+          <p:cNvPr id="5" name="Content Placeholder 3"/>
+          <p:cNvGraphicFramePr>
+            <a:graphicFrameLocks/>
+          </p:cNvGraphicFramePr>
+          <p:nvPr>
+            <p:extLst>
+              <p:ext uri="{D42A27DB-BD31-4B8C-83A1-F6EECF244321}">
+                <p14:modId xmlns:p14="http://schemas.microsoft.com/office/powerpoint/2010/main" val="1304012523"/>
+              </p:ext>
+            </p:extLst>
+          </p:nvPr>
+        </p:nvGraphicFramePr>
+        <p:xfrm>
+          <a:off x="592709" y="4978138"/>
           <a:ext cx="8330488" cy="1519524"/>
         </p:xfrm>
         <a:graphic>
@@ -4292,7 +4298,7 @@
                     <a:p>
                       <a:r>
                         <a:rPr lang="en-US" dirty="0" smtClean="0"/>
-                        <a:t>1.24</a:t>
+                        <a:t>1.19</a:t>
                       </a:r>
                       <a:endParaRPr lang="en-US" dirty="0"/>
                     </a:p>
@@ -4306,7 +4312,7 @@
                     <a:p>
                       <a:r>
                         <a:rPr lang="en-US" dirty="0" smtClean="0"/>
-                        <a:t>8.04</a:t>
+                        <a:t>7.99</a:t>
                       </a:r>
                       <a:endParaRPr lang="en-US" dirty="0"/>
                     </a:p>
@@ -4320,7 +4326,7 @@
                     <a:p>
                       <a:r>
                         <a:rPr lang="en-US" dirty="0" smtClean="0"/>
-                        <a:t>12.82</a:t>
+                        <a:t>12.34</a:t>
                       </a:r>
                       <a:endParaRPr lang="en-US" dirty="0"/>
                     </a:p>
@@ -4334,7 +4340,7 @@
                     <a:p>
                       <a:r>
                         <a:rPr lang="en-US" dirty="0" smtClean="0"/>
-                        <a:t>0.57</a:t>
+                        <a:t>0.47</a:t>
                       </a:r>
                       <a:endParaRPr lang="en-US" dirty="0"/>
                     </a:p>
@@ -4348,7 +4354,7 @@
                     <a:p>
                       <a:r>
                         <a:rPr lang="en-US" dirty="0" smtClean="0"/>
-                        <a:t>0.01</a:t>
+                        <a:t>0.02</a:t>
                       </a:r>
                       <a:endParaRPr lang="en-US" dirty="0"/>
                     </a:p>
@@ -4378,7 +4384,7 @@
                     <a:p>
                       <a:r>
                         <a:rPr lang="en-US" dirty="0" smtClean="0"/>
-                        <a:t>1.01</a:t>
+                        <a:t>0.93</a:t>
                       </a:r>
                       <a:endParaRPr lang="en-US" dirty="0"/>
                     </a:p>
@@ -4392,7 +4398,7 @@
                     <a:p>
                       <a:r>
                         <a:rPr lang="en-US" dirty="0" smtClean="0"/>
-                        <a:t>10.23</a:t>
+                        <a:t>8.54</a:t>
                       </a:r>
                       <a:endParaRPr lang="en-US" dirty="0"/>
                     </a:p>
@@ -4406,7 +4412,7 @@
                     <a:p>
                       <a:r>
                         <a:rPr lang="en-US" dirty="0" smtClean="0"/>
-                        <a:t>13.68</a:t>
+                        <a:t>11.53</a:t>
                       </a:r>
                       <a:endParaRPr lang="en-US" dirty="0"/>
                     </a:p>
@@ -4420,7 +4426,7 @@
                     <a:p>
                       <a:r>
                         <a:rPr lang="en-US" dirty="0" smtClean="0"/>
-                        <a:t>0.49</a:t>
+                        <a:t>0.41</a:t>
                       </a:r>
                       <a:endParaRPr lang="en-US" dirty="0"/>
                     </a:p>
@@ -4434,7 +4440,7 @@
                     <a:p>
                       <a:r>
                         <a:rPr lang="en-US" dirty="0" smtClean="0"/>
-                        <a:t>0.01</a:t>
+                        <a:t>0.09</a:t>
                       </a:r>
                       <a:endParaRPr lang="en-US" dirty="0"/>
                     </a:p>
@@ -4464,7 +4470,11 @@
                     <a:p>
                       <a:r>
                         <a:rPr lang="en-US" dirty="0" smtClean="0"/>
-                        <a:t>1.02 +- .19</a:t>
+                        <a:t>0.99 </a:t>
+                      </a:r>
+                      <a:r>
+                        <a:rPr lang="en-US" dirty="0" smtClean="0"/>
+                        <a:t>+- .19</a:t>
                       </a:r>
                       <a:endParaRPr lang="en-US" dirty="0"/>
                     </a:p>
@@ -4478,7 +4488,15 @@
                     <a:p>
                       <a:r>
                         <a:rPr lang="en-US" dirty="0" smtClean="0"/>
-                        <a:t>3.66 +- 2.4</a:t>
+                        <a:t>3.60 </a:t>
+                      </a:r>
+                      <a:r>
+                        <a:rPr lang="en-US" dirty="0" smtClean="0"/>
+                        <a:t>+- </a:t>
+                      </a:r>
+                      <a:r>
+                        <a:rPr lang="en-US" dirty="0" smtClean="0"/>
+                        <a:t>2.3</a:t>
                       </a:r>
                       <a:endParaRPr lang="en-US" dirty="0"/>
                     </a:p>
@@ -4492,11 +4510,19 @@
                     <a:p>
                       <a:r>
                         <a:rPr lang="en-US" dirty="0" smtClean="0"/>
-                        <a:t>18.09</a:t>
+                        <a:t>15.04</a:t>
                       </a:r>
                       <a:r>
                         <a:rPr lang="en-US" baseline="0" dirty="0" smtClean="0"/>
-                        <a:t> +- 12.04</a:t>
+                        <a:t> </a:t>
+                      </a:r>
+                      <a:r>
+                        <a:rPr lang="en-US" baseline="0" dirty="0" smtClean="0"/>
+                        <a:t>+- </a:t>
+                      </a:r>
+                      <a:r>
+                        <a:rPr lang="en-US" baseline="0" dirty="0" smtClean="0"/>
+                        <a:t>11.32</a:t>
                       </a:r>
                       <a:endParaRPr lang="en-US" dirty="0"/>
                     </a:p>
@@ -4510,7 +4536,11 @@
                     <a:p>
                       <a:r>
                         <a:rPr lang="en-US" dirty="0" smtClean="0"/>
-                        <a:t>0.60 +- 0.24</a:t>
+                        <a:t>0.52 </a:t>
+                      </a:r>
+                      <a:r>
+                        <a:rPr lang="en-US" dirty="0" smtClean="0"/>
+                        <a:t>+- 0.24</a:t>
                       </a:r>
                       <a:endParaRPr lang="en-US" dirty="0"/>
                     </a:p>
@@ -4524,7 +4554,15 @@
                     <a:p>
                       <a:r>
                         <a:rPr lang="en-US" dirty="0" smtClean="0"/>
-                        <a:t>0.01 +- 0.004</a:t>
+                        <a:t>0.02 </a:t>
+                      </a:r>
+                      <a:r>
+                        <a:rPr lang="en-US" dirty="0" smtClean="0"/>
+                        <a:t>+- </a:t>
+                      </a:r>
+                      <a:r>
+                        <a:rPr lang="en-US" dirty="0" smtClean="0"/>
+                        <a:t>0.015</a:t>
                       </a:r>
                       <a:endParaRPr lang="en-US" dirty="0"/>
                     </a:p>
@@ -4538,83 +4576,655 @@
       </p:graphicFrame>
       <p:sp>
         <p:nvSpPr>
-          <p:cNvPr id="5" name="TextBox 4"/>
-          <p:cNvSpPr txBox="1"/>
+          <p:cNvPr id="6" name="Rectangle 5"/>
+          <p:cNvSpPr/>
           <p:nvPr/>
         </p:nvSpPr>
         <p:spPr>
           <a:xfrm>
-            <a:off x="1436915" y="3116424"/>
-            <a:ext cx="13515046" cy="1477328"/>
+            <a:off x="9075575" y="5414734"/>
+            <a:ext cx="3203510" cy="923330"/>
           </a:xfrm>
           <a:prstGeom prst="rect">
             <a:avLst/>
           </a:prstGeom>
-          <a:noFill/>
         </p:spPr>
         <p:txBody>
-          <a:bodyPr wrap="none" rtlCol="0">
+          <a:bodyPr wrap="square">
             <a:spAutoFit/>
           </a:bodyPr>
           <a:lstStyle/>
           <a:p>
             <a:r>
               <a:rPr lang="en-US" dirty="0" smtClean="0"/>
-              <a:t>If fitting the A or V distributions directly, allowing mean to vary: </a:t>
-            </a:r>
+              <a:t>Unimodal trials – mean </a:t>
+            </a:r>
+            <a:r>
+              <a:rPr lang="en-US" dirty="0" err="1" smtClean="0"/>
+              <a:t>normfit</a:t>
+            </a:r>
+            <a:endParaRPr lang="en-US" dirty="0" smtClean="0"/>
           </a:p>
           <a:p>
             <a:r>
               <a:rPr lang="en-US" dirty="0" smtClean="0"/>
-              <a:t>Juno V_sig = 1.22, </a:t>
-            </a:r>
-            <a:r>
-              <a:rPr lang="en-US" u="sng" dirty="0" smtClean="0"/>
-              <a:t>A_sig = 5.32 </a:t>
-            </a:r>
-          </a:p>
-          <a:p>
-            <a:r>
-              <a:rPr lang="en-US" dirty="0" smtClean="0"/>
-              <a:t>Yoko V_sig = 1.33, </a:t>
-            </a:r>
-            <a:r>
-              <a:rPr lang="en-US" u="sng" dirty="0" smtClean="0"/>
-              <a:t>A_sig = 5.12</a:t>
-            </a:r>
-          </a:p>
-          <a:p>
-            <a:endParaRPr lang="en-US" u="sng" dirty="0"/>
-          </a:p>
-          <a:p>
-            <a:r>
-              <a:rPr lang="en-US" dirty="0" smtClean="0"/>
-              <a:t>This doesn’t account for the prior though, and after combining the prior variance with </a:t>
-            </a:r>
-            <a:r>
-              <a:rPr lang="en-US" dirty="0" err="1" smtClean="0"/>
+              <a:t>Juno </a:t>
+            </a:r>
+            <a:r>
+              <a:rPr lang="en-US" dirty="0" err="1"/>
+              <a:t>V_sig</a:t>
+            </a:r>
+            <a:r>
+              <a:rPr lang="en-US" dirty="0"/>
+              <a:t> = 1.22, </a:t>
+            </a:r>
+            <a:r>
+              <a:rPr lang="en-US" u="sng" dirty="0" err="1"/>
               <a:t>A_sig</a:t>
             </a:r>
             <a:r>
-              <a:rPr lang="en-US" dirty="0" smtClean="0"/>
-              <a:t> you will end up with something </a:t>
-            </a:r>
-            <a:r>
-              <a:rPr lang="en-US" dirty="0" err="1" smtClean="0"/>
-              <a:t>kindof</a:t>
-            </a:r>
-            <a:r>
-              <a:rPr lang="en-US" dirty="0" smtClean="0"/>
-              <a:t> close to this</a:t>
-            </a:r>
-            <a:endParaRPr lang="en-US" dirty="0"/>
+              <a:rPr lang="en-US" u="sng" dirty="0"/>
+              <a:t> = 5.32 </a:t>
+            </a:r>
+          </a:p>
+          <a:p>
+            <a:r>
+              <a:rPr lang="en-US" dirty="0"/>
+              <a:t>Yoko </a:t>
+            </a:r>
+            <a:r>
+              <a:rPr lang="en-US" dirty="0" err="1"/>
+              <a:t>V_sig</a:t>
+            </a:r>
+            <a:r>
+              <a:rPr lang="en-US" dirty="0"/>
+              <a:t> = 1.33, </a:t>
+            </a:r>
+            <a:r>
+              <a:rPr lang="en-US" u="sng" dirty="0" err="1"/>
+              <a:t>A_sig</a:t>
+            </a:r>
+            <a:r>
+              <a:rPr lang="en-US" u="sng" dirty="0"/>
+              <a:t> = 5.12</a:t>
+            </a:r>
           </a:p>
         </p:txBody>
       </p:sp>
     </p:spTree>
     <p:extLst>
       <p:ext uri="{BB962C8B-B14F-4D97-AF65-F5344CB8AC3E}">
-        <p14:creationId xmlns:p14="http://schemas.microsoft.com/office/powerpoint/2010/main" val="3014291142"/>
+        <p14:creationId xmlns:p14="http://schemas.microsoft.com/office/powerpoint/2010/main" val="3833188919"/>
+      </p:ext>
+    </p:extLst>
+  </p:cSld>
+  <p:clrMapOvr>
+    <a:masterClrMapping/>
+  </p:clrMapOvr>
+</p:sld>
+</file>
+
+<file path=ppt/slides/slide12.xml><?xml version="1.0" encoding="utf-8"?>
+<p:sld xmlns:a="http://schemas.openxmlformats.org/drawingml/2006/main" xmlns:r="http://schemas.openxmlformats.org/officeDocument/2006/relationships" xmlns:p="http://schemas.openxmlformats.org/presentationml/2006/main">
+  <p:cSld>
+    <p:spTree>
+      <p:nvGrpSpPr>
+        <p:cNvPr id="1" name=""/>
+        <p:cNvGrpSpPr/>
+        <p:nvPr/>
+      </p:nvGrpSpPr>
+      <p:grpSpPr>
+        <a:xfrm>
+          <a:off x="0" y="0"/>
+          <a:ext cx="0" cy="0"/>
+          <a:chOff x="0" y="0"/>
+          <a:chExt cx="0" cy="0"/>
+        </a:xfrm>
+      </p:grpSpPr>
+      <p:sp>
+        <p:nvSpPr>
+          <p:cNvPr id="2" name="Title 1"/>
+          <p:cNvSpPr>
+            <a:spLocks noGrp="1"/>
+          </p:cNvSpPr>
+          <p:nvPr>
+            <p:ph type="ctrTitle"/>
+          </p:nvPr>
+        </p:nvSpPr>
+        <p:spPr/>
+        <p:txBody>
+          <a:bodyPr/>
+          <a:lstStyle/>
+          <a:p>
+            <a:r>
+              <a:rPr lang="en-US" dirty="0" smtClean="0"/>
+              <a:t>Issues</a:t>
+            </a:r>
+            <a:endParaRPr lang="en-US" dirty="0"/>
+          </a:p>
+        </p:txBody>
+      </p:sp>
+      <p:sp>
+        <p:nvSpPr>
+          <p:cNvPr id="3" name="Subtitle 2"/>
+          <p:cNvSpPr>
+            <a:spLocks noGrp="1"/>
+          </p:cNvSpPr>
+          <p:nvPr>
+            <p:ph type="subTitle" idx="1"/>
+          </p:nvPr>
+        </p:nvSpPr>
+        <p:spPr/>
+        <p:txBody>
+          <a:bodyPr/>
+          <a:lstStyle/>
+          <a:p>
+            <a:endParaRPr lang="en-US"/>
+          </a:p>
+        </p:txBody>
+      </p:sp>
+    </p:spTree>
+    <p:extLst>
+      <p:ext uri="{BB962C8B-B14F-4D97-AF65-F5344CB8AC3E}">
+        <p14:creationId xmlns:p14="http://schemas.microsoft.com/office/powerpoint/2010/main" val="1679965713"/>
+      </p:ext>
+    </p:extLst>
+  </p:cSld>
+  <p:clrMapOvr>
+    <a:masterClrMapping/>
+  </p:clrMapOvr>
+</p:sld>
+</file>
+
+<file path=ppt/slides/slide13.xml><?xml version="1.0" encoding="utf-8"?>
+<p:sld xmlns:a="http://schemas.openxmlformats.org/drawingml/2006/main" xmlns:r="http://schemas.openxmlformats.org/officeDocument/2006/relationships" xmlns:p="http://schemas.openxmlformats.org/presentationml/2006/main">
+  <p:cSld>
+    <p:spTree>
+      <p:nvGrpSpPr>
+        <p:cNvPr id="1" name=""/>
+        <p:cNvGrpSpPr/>
+        <p:nvPr/>
+      </p:nvGrpSpPr>
+      <p:grpSpPr>
+        <a:xfrm>
+          <a:off x="0" y="0"/>
+          <a:ext cx="0" cy="0"/>
+          <a:chOff x="0" y="0"/>
+          <a:chExt cx="0" cy="0"/>
+        </a:xfrm>
+      </p:grpSpPr>
+      <p:sp>
+        <p:nvSpPr>
+          <p:cNvPr id="2" name="Title 1"/>
+          <p:cNvSpPr>
+            <a:spLocks noGrp="1"/>
+          </p:cNvSpPr>
+          <p:nvPr>
+            <p:ph type="title"/>
+          </p:nvPr>
+        </p:nvSpPr>
+        <p:spPr/>
+        <p:txBody>
+          <a:bodyPr/>
+          <a:lstStyle/>
+          <a:p>
+            <a:r>
+              <a:rPr lang="en-US" dirty="0" err="1" smtClean="0"/>
+              <a:t>Aud</a:t>
+            </a:r>
+            <a:r>
+              <a:rPr lang="en-US" dirty="0" smtClean="0"/>
+              <a:t> variance greatly overestimated, ex from Monkey J AV trials</a:t>
+            </a:r>
+            <a:endParaRPr lang="en-US" dirty="0"/>
+          </a:p>
+        </p:txBody>
+      </p:sp>
+      <p:pic>
+        <p:nvPicPr>
+          <p:cNvPr id="7" name="Content Placeholder 6"/>
+          <p:cNvPicPr>
+            <a:picLocks noGrp="1" noChangeAspect="1"/>
+          </p:cNvPicPr>
+          <p:nvPr>
+            <p:ph idx="1"/>
+          </p:nvPr>
+        </p:nvPicPr>
+        <p:blipFill>
+          <a:blip r:embed="rId3" cstate="print">
+            <a:extLst>
+              <a:ext uri="{28A0092B-C50C-407E-A947-70E740481C1C}">
+                <a14:useLocalDpi xmlns:a14="http://schemas.microsoft.com/office/drawing/2010/main" val="0"/>
+              </a:ext>
+            </a:extLst>
+          </a:blip>
+          <a:stretch>
+            <a:fillRect/>
+          </a:stretch>
+        </p:blipFill>
+        <p:spPr>
+          <a:xfrm>
+            <a:off x="973720" y="559838"/>
+            <a:ext cx="10244560" cy="3200400"/>
+          </a:xfrm>
+        </p:spPr>
+      </p:pic>
+      <p:pic>
+        <p:nvPicPr>
+          <p:cNvPr id="8" name="Picture 7"/>
+          <p:cNvPicPr>
+            <a:picLocks noChangeAspect="1"/>
+          </p:cNvPicPr>
+          <p:nvPr/>
+        </p:nvPicPr>
+        <p:blipFill>
+          <a:blip r:embed="rId4" cstate="print">
+            <a:extLst>
+              <a:ext uri="{28A0092B-C50C-407E-A947-70E740481C1C}">
+                <a14:useLocalDpi xmlns:a14="http://schemas.microsoft.com/office/drawing/2010/main" val="0"/>
+              </a:ext>
+            </a:extLst>
+          </a:blip>
+          <a:stretch>
+            <a:fillRect/>
+          </a:stretch>
+        </p:blipFill>
+        <p:spPr>
+          <a:xfrm>
+            <a:off x="973720" y="3657600"/>
+            <a:ext cx="10244561" cy="3200400"/>
+          </a:xfrm>
+          <a:prstGeom prst="rect">
+            <a:avLst/>
+          </a:prstGeom>
+        </p:spPr>
+      </p:pic>
+    </p:spTree>
+    <p:extLst>
+      <p:ext uri="{BB962C8B-B14F-4D97-AF65-F5344CB8AC3E}">
+        <p14:creationId xmlns:p14="http://schemas.microsoft.com/office/powerpoint/2010/main" val="353780433"/>
+      </p:ext>
+    </p:extLst>
+  </p:cSld>
+  <p:clrMapOvr>
+    <a:masterClrMapping/>
+  </p:clrMapOvr>
+</p:sld>
+</file>
+
+<file path=ppt/slides/slide14.xml><?xml version="1.0" encoding="utf-8"?>
+<p:sld xmlns:a="http://schemas.openxmlformats.org/drawingml/2006/main" xmlns:r="http://schemas.openxmlformats.org/officeDocument/2006/relationships" xmlns:p="http://schemas.openxmlformats.org/presentationml/2006/main">
+  <p:cSld>
+    <p:spTree>
+      <p:nvGrpSpPr>
+        <p:cNvPr id="1" name=""/>
+        <p:cNvGrpSpPr/>
+        <p:nvPr/>
+      </p:nvGrpSpPr>
+      <p:grpSpPr>
+        <a:xfrm>
+          <a:off x="0" y="0"/>
+          <a:ext cx="0" cy="0"/>
+          <a:chOff x="0" y="0"/>
+          <a:chExt cx="0" cy="0"/>
+        </a:xfrm>
+      </p:grpSpPr>
+      <p:sp>
+        <p:nvSpPr>
+          <p:cNvPr id="2" name="Title 1"/>
+          <p:cNvSpPr>
+            <a:spLocks noGrp="1"/>
+          </p:cNvSpPr>
+          <p:nvPr>
+            <p:ph type="title"/>
+          </p:nvPr>
+        </p:nvSpPr>
+        <p:spPr/>
+        <p:txBody>
+          <a:bodyPr/>
+          <a:lstStyle/>
+          <a:p>
+            <a:r>
+              <a:rPr lang="en-US" dirty="0" smtClean="0"/>
+              <a:t>Monkey Y trials</a:t>
+            </a:r>
+            <a:endParaRPr lang="en-US" dirty="0"/>
+          </a:p>
+        </p:txBody>
+      </p:sp>
+      <p:pic>
+        <p:nvPicPr>
+          <p:cNvPr id="4" name="Content Placeholder 3"/>
+          <p:cNvPicPr>
+            <a:picLocks noGrp="1" noChangeAspect="1"/>
+          </p:cNvPicPr>
+          <p:nvPr>
+            <p:ph idx="1"/>
+          </p:nvPr>
+        </p:nvPicPr>
+        <p:blipFill>
+          <a:blip r:embed="rId2" cstate="print">
+            <a:extLst>
+              <a:ext uri="{28A0092B-C50C-407E-A947-70E740481C1C}">
+                <a14:useLocalDpi xmlns:a14="http://schemas.microsoft.com/office/drawing/2010/main" val="0"/>
+              </a:ext>
+            </a:extLst>
+          </a:blip>
+          <a:stretch>
+            <a:fillRect/>
+          </a:stretch>
+        </p:blipFill>
+        <p:spPr>
+          <a:xfrm>
+            <a:off x="973720" y="688578"/>
+            <a:ext cx="10244560" cy="3200400"/>
+          </a:xfrm>
+        </p:spPr>
+      </p:pic>
+      <p:pic>
+        <p:nvPicPr>
+          <p:cNvPr id="5" name="Picture 4"/>
+          <p:cNvPicPr>
+            <a:picLocks noChangeAspect="1"/>
+          </p:cNvPicPr>
+          <p:nvPr/>
+        </p:nvPicPr>
+        <p:blipFill>
+          <a:blip r:embed="rId3" cstate="print">
+            <a:extLst>
+              <a:ext uri="{28A0092B-C50C-407E-A947-70E740481C1C}">
+                <a14:useLocalDpi xmlns:a14="http://schemas.microsoft.com/office/drawing/2010/main" val="0"/>
+              </a:ext>
+            </a:extLst>
+          </a:blip>
+          <a:stretch>
+            <a:fillRect/>
+          </a:stretch>
+        </p:blipFill>
+        <p:spPr>
+          <a:xfrm>
+            <a:off x="973720" y="3657600"/>
+            <a:ext cx="10244560" cy="3200400"/>
+          </a:xfrm>
+          <a:prstGeom prst="rect">
+            <a:avLst/>
+          </a:prstGeom>
+        </p:spPr>
+      </p:pic>
+    </p:spTree>
+    <p:extLst>
+      <p:ext uri="{BB962C8B-B14F-4D97-AF65-F5344CB8AC3E}">
+        <p14:creationId xmlns:p14="http://schemas.microsoft.com/office/powerpoint/2010/main" val="512425004"/>
+      </p:ext>
+    </p:extLst>
+  </p:cSld>
+  <p:clrMapOvr>
+    <a:masterClrMapping/>
+  </p:clrMapOvr>
+</p:sld>
+</file>
+
+<file path=ppt/slides/slide15.xml><?xml version="1.0" encoding="utf-8"?>
+<p:sld xmlns:a="http://schemas.openxmlformats.org/drawingml/2006/main" xmlns:r="http://schemas.openxmlformats.org/officeDocument/2006/relationships" xmlns:p="http://schemas.openxmlformats.org/presentationml/2006/main">
+  <p:cSld>
+    <p:spTree>
+      <p:nvGrpSpPr>
+        <p:cNvPr id="1" name=""/>
+        <p:cNvGrpSpPr/>
+        <p:nvPr/>
+      </p:nvGrpSpPr>
+      <p:grpSpPr>
+        <a:xfrm>
+          <a:off x="0" y="0"/>
+          <a:ext cx="0" cy="0"/>
+          <a:chOff x="0" y="0"/>
+          <a:chExt cx="0" cy="0"/>
+        </a:xfrm>
+      </p:grpSpPr>
+      <p:sp>
+        <p:nvSpPr>
+          <p:cNvPr id="2" name="Title 1"/>
+          <p:cNvSpPr>
+            <a:spLocks noGrp="1"/>
+          </p:cNvSpPr>
+          <p:nvPr>
+            <p:ph type="title"/>
+          </p:nvPr>
+        </p:nvSpPr>
+        <p:spPr/>
+        <p:txBody>
+          <a:bodyPr/>
+          <a:lstStyle/>
+          <a:p>
+            <a:r>
+              <a:rPr lang="en-US" dirty="0" smtClean="0"/>
+              <a:t>Yoko single saccade lapses</a:t>
+            </a:r>
+            <a:endParaRPr lang="en-US" dirty="0"/>
+          </a:p>
+        </p:txBody>
+      </p:sp>
+      <p:pic>
+        <p:nvPicPr>
+          <p:cNvPr id="4" name="Content Placeholder 3"/>
+          <p:cNvPicPr>
+            <a:picLocks noGrp="1" noChangeAspect="1"/>
+          </p:cNvPicPr>
+          <p:nvPr>
+            <p:ph idx="1"/>
+          </p:nvPr>
+        </p:nvPicPr>
+        <p:blipFill>
+          <a:blip r:embed="rId2">
+            <a:extLst>
+              <a:ext uri="{28A0092B-C50C-407E-A947-70E740481C1C}">
+                <a14:useLocalDpi xmlns:a14="http://schemas.microsoft.com/office/drawing/2010/main" val="0"/>
+              </a:ext>
+            </a:extLst>
+          </a:blip>
+          <a:stretch>
+            <a:fillRect/>
+          </a:stretch>
+        </p:blipFill>
+        <p:spPr>
+          <a:xfrm>
+            <a:off x="6032461" y="1961522"/>
+            <a:ext cx="5333559" cy="3998645"/>
+          </a:xfrm>
+        </p:spPr>
+      </p:pic>
+      <p:pic>
+        <p:nvPicPr>
+          <p:cNvPr id="5" name="Picture 4"/>
+          <p:cNvPicPr>
+            <a:picLocks noChangeAspect="1"/>
+          </p:cNvPicPr>
+          <p:nvPr/>
+        </p:nvPicPr>
+        <p:blipFill>
+          <a:blip r:embed="rId3">
+            <a:extLst>
+              <a:ext uri="{28A0092B-C50C-407E-A947-70E740481C1C}">
+                <a14:useLocalDpi xmlns:a14="http://schemas.microsoft.com/office/drawing/2010/main" val="0"/>
+              </a:ext>
+            </a:extLst>
+          </a:blip>
+          <a:stretch>
+            <a:fillRect/>
+          </a:stretch>
+        </p:blipFill>
+        <p:spPr>
+          <a:xfrm>
+            <a:off x="592713" y="1961522"/>
+            <a:ext cx="5333559" cy="3998645"/>
+          </a:xfrm>
+          <a:prstGeom prst="rect">
+            <a:avLst/>
+          </a:prstGeom>
+        </p:spPr>
+      </p:pic>
+    </p:spTree>
+    <p:extLst>
+      <p:ext uri="{BB962C8B-B14F-4D97-AF65-F5344CB8AC3E}">
+        <p14:creationId xmlns:p14="http://schemas.microsoft.com/office/powerpoint/2010/main" val="2643738349"/>
+      </p:ext>
+    </p:extLst>
+  </p:cSld>
+  <p:clrMapOvr>
+    <a:masterClrMapping/>
+  </p:clrMapOvr>
+</p:sld>
+</file>
+
+<file path=ppt/slides/slide2.xml><?xml version="1.0" encoding="utf-8"?>
+<p:sld xmlns:a="http://schemas.openxmlformats.org/drawingml/2006/main" xmlns:r="http://schemas.openxmlformats.org/officeDocument/2006/relationships" xmlns:p="http://schemas.openxmlformats.org/presentationml/2006/main">
+  <p:cSld>
+    <p:spTree>
+      <p:nvGrpSpPr>
+        <p:cNvPr id="1" name=""/>
+        <p:cNvGrpSpPr/>
+        <p:nvPr/>
+      </p:nvGrpSpPr>
+      <p:grpSpPr>
+        <a:xfrm>
+          <a:off x="0" y="0"/>
+          <a:ext cx="0" cy="0"/>
+          <a:chOff x="0" y="0"/>
+          <a:chExt cx="0" cy="0"/>
+        </a:xfrm>
+      </p:grpSpPr>
+      <p:sp>
+        <p:nvSpPr>
+          <p:cNvPr id="3" name="Content Placeholder 2"/>
+          <p:cNvSpPr>
+            <a:spLocks noGrp="1"/>
+          </p:cNvSpPr>
+          <p:nvPr>
+            <p:ph idx="1"/>
+          </p:nvPr>
+        </p:nvSpPr>
+        <p:spPr>
+          <a:xfrm>
+            <a:off x="782216" y="1181812"/>
+            <a:ext cx="10515600" cy="4556514"/>
+          </a:xfrm>
+        </p:spPr>
+        <p:txBody>
+          <a:bodyPr>
+            <a:normAutofit fontScale="92500" lnSpcReduction="20000"/>
+          </a:bodyPr>
+          <a:lstStyle/>
+          <a:p>
+            <a:r>
+              <a:rPr lang="en-US" dirty="0" smtClean="0"/>
+              <a:t>Three fitting conditions</a:t>
+            </a:r>
+          </a:p>
+          <a:p>
+            <a:pPr lvl="1"/>
+            <a:r>
+              <a:rPr lang="en-US" dirty="0" smtClean="0"/>
+              <a:t>Unity judgement task (number of saccades)</a:t>
+            </a:r>
+          </a:p>
+          <a:p>
+            <a:pPr lvl="1"/>
+            <a:r>
+              <a:rPr lang="en-US" dirty="0" smtClean="0"/>
+              <a:t>Localization task (location of A and V saccades, if one saccade A = V )</a:t>
+            </a:r>
+          </a:p>
+          <a:p>
+            <a:pPr lvl="1"/>
+            <a:r>
+              <a:rPr lang="en-US" dirty="0" smtClean="0"/>
+              <a:t>Joint task (maximize sum of log likelihood of both using same parameter values)</a:t>
+            </a:r>
+          </a:p>
+          <a:p>
+            <a:pPr lvl="1"/>
+            <a:endParaRPr lang="en-US" dirty="0" smtClean="0"/>
+          </a:p>
+          <a:p>
+            <a:r>
+              <a:rPr lang="en-US" dirty="0" smtClean="0"/>
+              <a:t>For joint fit, paired Bayesian unity judgement with 3 possible localization strategies </a:t>
+            </a:r>
+          </a:p>
+          <a:p>
+            <a:pPr lvl="1"/>
+            <a:r>
+              <a:rPr lang="en-US" dirty="0" smtClean="0"/>
+              <a:t>Bayesian reweighting (using posterior probability from unity judgement)</a:t>
+            </a:r>
+          </a:p>
+          <a:p>
+            <a:pPr lvl="1"/>
+            <a:r>
+              <a:rPr lang="en-US" dirty="0" smtClean="0"/>
+              <a:t>Model selection (weight = 1 or 0, threshold is </a:t>
+            </a:r>
+            <a:r>
+              <a:rPr lang="en-US" dirty="0" err="1" smtClean="0"/>
+              <a:t>Pr</a:t>
+            </a:r>
+            <a:r>
+              <a:rPr lang="en-US" dirty="0" smtClean="0"/>
+              <a:t>(C=1) &gt;0.5)</a:t>
+            </a:r>
+          </a:p>
+          <a:p>
+            <a:pPr lvl="1"/>
+            <a:r>
+              <a:rPr lang="en-US" dirty="0" smtClean="0"/>
+              <a:t>Probabilistic fusion - null (fixed weight = prior common)</a:t>
+            </a:r>
+            <a:endParaRPr lang="en-US" dirty="0"/>
+          </a:p>
+          <a:p>
+            <a:endParaRPr lang="en-US" dirty="0"/>
+          </a:p>
+          <a:p>
+            <a:r>
+              <a:rPr lang="en-US" dirty="0" smtClean="0"/>
+              <a:t>Binning saccade locations in 1 degree bins</a:t>
+            </a:r>
+          </a:p>
+          <a:p>
+            <a:r>
+              <a:rPr lang="en-US" dirty="0"/>
+              <a:t>N</a:t>
+            </a:r>
+            <a:r>
+              <a:rPr lang="en-US" dirty="0" smtClean="0"/>
+              <a:t>umerically integrating from -50 to +50 for each condition </a:t>
+            </a:r>
+          </a:p>
+        </p:txBody>
+      </p:sp>
+      <p:sp>
+        <p:nvSpPr>
+          <p:cNvPr id="8" name="Title 7"/>
+          <p:cNvSpPr>
+            <a:spLocks noGrp="1"/>
+          </p:cNvSpPr>
+          <p:nvPr>
+            <p:ph type="title"/>
+          </p:nvPr>
+        </p:nvSpPr>
+        <p:spPr/>
+        <p:txBody>
+          <a:bodyPr/>
+          <a:lstStyle/>
+          <a:p>
+            <a:endParaRPr lang="en-US"/>
+          </a:p>
+        </p:txBody>
+      </p:sp>
+    </p:spTree>
+    <p:extLst>
+      <p:ext uri="{BB962C8B-B14F-4D97-AF65-F5344CB8AC3E}">
+        <p14:creationId xmlns:p14="http://schemas.microsoft.com/office/powerpoint/2010/main" val="792167339"/>
       </p:ext>
     </p:extLst>
   </p:cSld>
@@ -4628,6 +5238,1428 @@
       </p:par>
     </p:tnLst>
   </p:timing>
+</p:sld>
+</file>
+
+<file path=ppt/slides/slide3.xml><?xml version="1.0" encoding="utf-8"?>
+<p:sld xmlns:a="http://schemas.openxmlformats.org/drawingml/2006/main" xmlns:r="http://schemas.openxmlformats.org/officeDocument/2006/relationships" xmlns:p="http://schemas.openxmlformats.org/presentationml/2006/main">
+  <p:cSld>
+    <p:spTree>
+      <p:nvGrpSpPr>
+        <p:cNvPr id="1" name=""/>
+        <p:cNvGrpSpPr/>
+        <p:nvPr/>
+      </p:nvGrpSpPr>
+      <p:grpSpPr>
+        <a:xfrm>
+          <a:off x="0" y="0"/>
+          <a:ext cx="0" cy="0"/>
+          <a:chOff x="0" y="0"/>
+          <a:chExt cx="0" cy="0"/>
+        </a:xfrm>
+      </p:grpSpPr>
+      <p:pic>
+        <p:nvPicPr>
+          <p:cNvPr id="11" name="Picture 10"/>
+          <p:cNvPicPr>
+            <a:picLocks noChangeAspect="1"/>
+          </p:cNvPicPr>
+          <p:nvPr/>
+        </p:nvPicPr>
+        <p:blipFill>
+          <a:blip r:embed="rId2">
+            <a:extLst>
+              <a:ext uri="{28A0092B-C50C-407E-A947-70E740481C1C}">
+                <a14:useLocalDpi xmlns:a14="http://schemas.microsoft.com/office/drawing/2010/main" val="0"/>
+              </a:ext>
+            </a:extLst>
+          </a:blip>
+          <a:stretch>
+            <a:fillRect/>
+          </a:stretch>
+        </p:blipFill>
+        <p:spPr>
+          <a:xfrm>
+            <a:off x="335902" y="992964"/>
+            <a:ext cx="3963911" cy="2971800"/>
+          </a:xfrm>
+          <a:prstGeom prst="rect">
+            <a:avLst/>
+          </a:prstGeom>
+        </p:spPr>
+      </p:pic>
+      <p:pic>
+        <p:nvPicPr>
+          <p:cNvPr id="8" name="Picture 7"/>
+          <p:cNvPicPr>
+            <a:picLocks noChangeAspect="1"/>
+          </p:cNvPicPr>
+          <p:nvPr/>
+        </p:nvPicPr>
+        <p:blipFill>
+          <a:blip r:embed="rId3">
+            <a:extLst>
+              <a:ext uri="{28A0092B-C50C-407E-A947-70E740481C1C}">
+                <a14:useLocalDpi xmlns:a14="http://schemas.microsoft.com/office/drawing/2010/main" val="0"/>
+              </a:ext>
+            </a:extLst>
+          </a:blip>
+          <a:stretch>
+            <a:fillRect/>
+          </a:stretch>
+        </p:blipFill>
+        <p:spPr>
+          <a:xfrm>
+            <a:off x="4026470" y="1007305"/>
+            <a:ext cx="3963911" cy="2971800"/>
+          </a:xfrm>
+          <a:prstGeom prst="rect">
+            <a:avLst/>
+          </a:prstGeom>
+        </p:spPr>
+      </p:pic>
+      <p:sp>
+        <p:nvSpPr>
+          <p:cNvPr id="2" name="Title 1"/>
+          <p:cNvSpPr>
+            <a:spLocks noGrp="1"/>
+          </p:cNvSpPr>
+          <p:nvPr>
+            <p:ph type="title"/>
+          </p:nvPr>
+        </p:nvSpPr>
+        <p:spPr/>
+        <p:txBody>
+          <a:bodyPr>
+            <a:normAutofit fontScale="90000"/>
+          </a:bodyPr>
+          <a:lstStyle/>
+          <a:p>
+            <a:r>
+              <a:rPr lang="en-US" dirty="0" smtClean="0"/>
+              <a:t>Unity </a:t>
+            </a:r>
+            <a:r>
+              <a:rPr lang="en-US" dirty="0" smtClean="0"/>
+              <a:t>judgement [p(</a:t>
+            </a:r>
+            <a:r>
+              <a:rPr lang="en-US" dirty="0" err="1" smtClean="0"/>
+              <a:t>C|xa,xv</a:t>
+            </a:r>
+            <a:r>
+              <a:rPr lang="en-US" dirty="0" smtClean="0"/>
+              <a:t>)] </a:t>
+            </a:r>
+            <a:r>
+              <a:rPr lang="en-US" dirty="0" smtClean="0"/>
+              <a:t>– human (n=7)</a:t>
+            </a:r>
+            <a:endParaRPr lang="en-US" dirty="0"/>
+          </a:p>
+        </p:txBody>
+      </p:sp>
+      <p:pic>
+        <p:nvPicPr>
+          <p:cNvPr id="4" name="Content Placeholder 3"/>
+          <p:cNvPicPr>
+            <a:picLocks noGrp="1" noChangeAspect="1"/>
+          </p:cNvPicPr>
+          <p:nvPr>
+            <p:ph idx="1"/>
+          </p:nvPr>
+        </p:nvPicPr>
+        <p:blipFill>
+          <a:blip r:embed="rId4">
+            <a:extLst>
+              <a:ext uri="{28A0092B-C50C-407E-A947-70E740481C1C}">
+                <a14:useLocalDpi xmlns:a14="http://schemas.microsoft.com/office/drawing/2010/main" val="0"/>
+              </a:ext>
+            </a:extLst>
+          </a:blip>
+          <a:stretch>
+            <a:fillRect/>
+          </a:stretch>
+        </p:blipFill>
+        <p:spPr>
+          <a:xfrm>
+            <a:off x="7940352" y="990166"/>
+            <a:ext cx="3963912" cy="2971800"/>
+          </a:xfrm>
+        </p:spPr>
+      </p:pic>
+      <p:pic>
+        <p:nvPicPr>
+          <p:cNvPr id="5" name="Picture 4"/>
+          <p:cNvPicPr>
+            <a:picLocks noChangeAspect="1"/>
+          </p:cNvPicPr>
+          <p:nvPr/>
+        </p:nvPicPr>
+        <p:blipFill>
+          <a:blip r:embed="rId5">
+            <a:extLst>
+              <a:ext uri="{28A0092B-C50C-407E-A947-70E740481C1C}">
+                <a14:useLocalDpi xmlns:a14="http://schemas.microsoft.com/office/drawing/2010/main" val="0"/>
+              </a:ext>
+            </a:extLst>
+          </a:blip>
+          <a:stretch>
+            <a:fillRect/>
+          </a:stretch>
+        </p:blipFill>
+        <p:spPr>
+          <a:xfrm>
+            <a:off x="7940352" y="3798682"/>
+            <a:ext cx="3963912" cy="2971800"/>
+          </a:xfrm>
+          <a:prstGeom prst="rect">
+            <a:avLst/>
+          </a:prstGeom>
+        </p:spPr>
+      </p:pic>
+      <p:sp>
+        <p:nvSpPr>
+          <p:cNvPr id="6" name="TextBox 5"/>
+          <p:cNvSpPr txBox="1"/>
+          <p:nvPr/>
+        </p:nvSpPr>
+        <p:spPr>
+          <a:xfrm>
+            <a:off x="9227975" y="559838"/>
+            <a:ext cx="1934825" cy="369332"/>
+          </a:xfrm>
+          <a:prstGeom prst="rect">
+            <a:avLst/>
+          </a:prstGeom>
+          <a:noFill/>
+        </p:spPr>
+        <p:txBody>
+          <a:bodyPr wrap="none" rtlCol="0">
+            <a:spAutoFit/>
+          </a:bodyPr>
+          <a:lstStyle/>
+          <a:p>
+            <a:r>
+              <a:rPr lang="en-US" dirty="0" smtClean="0"/>
+              <a:t>Bayes - Bayes Joint</a:t>
+            </a:r>
+            <a:endParaRPr lang="en-US" dirty="0"/>
+          </a:p>
+        </p:txBody>
+      </p:sp>
+      <p:pic>
+        <p:nvPicPr>
+          <p:cNvPr id="7" name="Picture 6"/>
+          <p:cNvPicPr>
+            <a:picLocks noChangeAspect="1"/>
+          </p:cNvPicPr>
+          <p:nvPr/>
+        </p:nvPicPr>
+        <p:blipFill>
+          <a:blip r:embed="rId6">
+            <a:extLst>
+              <a:ext uri="{28A0092B-C50C-407E-A947-70E740481C1C}">
+                <a14:useLocalDpi xmlns:a14="http://schemas.microsoft.com/office/drawing/2010/main" val="0"/>
+              </a:ext>
+            </a:extLst>
+          </a:blip>
+          <a:stretch>
+            <a:fillRect/>
+          </a:stretch>
+        </p:blipFill>
+        <p:spPr>
+          <a:xfrm>
+            <a:off x="4026470" y="3801480"/>
+            <a:ext cx="3963910" cy="2971800"/>
+          </a:xfrm>
+          <a:prstGeom prst="rect">
+            <a:avLst/>
+          </a:prstGeom>
+        </p:spPr>
+      </p:pic>
+      <p:sp>
+        <p:nvSpPr>
+          <p:cNvPr id="9" name="TextBox 8"/>
+          <p:cNvSpPr txBox="1"/>
+          <p:nvPr/>
+        </p:nvSpPr>
+        <p:spPr>
+          <a:xfrm>
+            <a:off x="5321559" y="559838"/>
+            <a:ext cx="1564146" cy="369332"/>
+          </a:xfrm>
+          <a:prstGeom prst="rect">
+            <a:avLst/>
+          </a:prstGeom>
+          <a:noFill/>
+        </p:spPr>
+        <p:txBody>
+          <a:bodyPr wrap="none" rtlCol="0">
+            <a:spAutoFit/>
+          </a:bodyPr>
+          <a:lstStyle/>
+          <a:p>
+            <a:r>
+              <a:rPr lang="en-US" dirty="0" smtClean="0"/>
+              <a:t>Bayesian Unity</a:t>
+            </a:r>
+            <a:endParaRPr lang="en-US" dirty="0"/>
+          </a:p>
+        </p:txBody>
+      </p:sp>
+      <p:pic>
+        <p:nvPicPr>
+          <p:cNvPr id="10" name="Picture 9"/>
+          <p:cNvPicPr>
+            <a:picLocks noChangeAspect="1"/>
+          </p:cNvPicPr>
+          <p:nvPr/>
+        </p:nvPicPr>
+        <p:blipFill>
+          <a:blip r:embed="rId7">
+            <a:extLst>
+              <a:ext uri="{28A0092B-C50C-407E-A947-70E740481C1C}">
+                <a14:useLocalDpi xmlns:a14="http://schemas.microsoft.com/office/drawing/2010/main" val="0"/>
+              </a:ext>
+            </a:extLst>
+          </a:blip>
+          <a:stretch>
+            <a:fillRect/>
+          </a:stretch>
+        </p:blipFill>
+        <p:spPr>
+          <a:xfrm>
+            <a:off x="327093" y="3798682"/>
+            <a:ext cx="3963911" cy="2971800"/>
+          </a:xfrm>
+          <a:prstGeom prst="rect">
+            <a:avLst/>
+          </a:prstGeom>
+        </p:spPr>
+      </p:pic>
+      <p:sp>
+        <p:nvSpPr>
+          <p:cNvPr id="12" name="TextBox 11"/>
+          <p:cNvSpPr txBox="1"/>
+          <p:nvPr/>
+        </p:nvSpPr>
+        <p:spPr>
+          <a:xfrm>
+            <a:off x="1502582" y="609291"/>
+            <a:ext cx="1996187" cy="369332"/>
+          </a:xfrm>
+          <a:prstGeom prst="rect">
+            <a:avLst/>
+          </a:prstGeom>
+          <a:noFill/>
+        </p:spPr>
+        <p:txBody>
+          <a:bodyPr wrap="none" rtlCol="0">
+            <a:spAutoFit/>
+          </a:bodyPr>
+          <a:lstStyle/>
+          <a:p>
+            <a:r>
+              <a:rPr lang="en-US" dirty="0" smtClean="0"/>
+              <a:t>Probabilistic Fusion</a:t>
+            </a:r>
+            <a:endParaRPr lang="en-US" dirty="0"/>
+          </a:p>
+        </p:txBody>
+      </p:sp>
+    </p:spTree>
+    <p:extLst>
+      <p:ext uri="{BB962C8B-B14F-4D97-AF65-F5344CB8AC3E}">
+        <p14:creationId xmlns:p14="http://schemas.microsoft.com/office/powerpoint/2010/main" val="2563030482"/>
+      </p:ext>
+    </p:extLst>
+  </p:cSld>
+  <p:clrMapOvr>
+    <a:masterClrMapping/>
+  </p:clrMapOvr>
+  <p:timing>
+    <p:tnLst>
+      <p:par>
+        <p:cTn id="1" dur="indefinite" restart="never" nodeType="tmRoot"/>
+      </p:par>
+    </p:tnLst>
+  </p:timing>
+</p:sld>
+</file>
+
+<file path=ppt/slides/slide4.xml><?xml version="1.0" encoding="utf-8"?>
+<p:sld xmlns:a="http://schemas.openxmlformats.org/drawingml/2006/main" xmlns:r="http://schemas.openxmlformats.org/officeDocument/2006/relationships" xmlns:p="http://schemas.openxmlformats.org/presentationml/2006/main">
+  <p:cSld>
+    <p:spTree>
+      <p:nvGrpSpPr>
+        <p:cNvPr id="1" name=""/>
+        <p:cNvGrpSpPr/>
+        <p:nvPr/>
+      </p:nvGrpSpPr>
+      <p:grpSpPr>
+        <a:xfrm>
+          <a:off x="0" y="0"/>
+          <a:ext cx="0" cy="0"/>
+          <a:chOff x="0" y="0"/>
+          <a:chExt cx="0" cy="0"/>
+        </a:xfrm>
+      </p:grpSpPr>
+      <p:sp>
+        <p:nvSpPr>
+          <p:cNvPr id="2" name="Title 1"/>
+          <p:cNvSpPr>
+            <a:spLocks noGrp="1"/>
+          </p:cNvSpPr>
+          <p:nvPr>
+            <p:ph type="title"/>
+          </p:nvPr>
+        </p:nvSpPr>
+        <p:spPr>
+          <a:xfrm>
+            <a:off x="390331" y="243828"/>
+            <a:ext cx="4135016" cy="353332"/>
+          </a:xfrm>
+        </p:spPr>
+        <p:txBody>
+          <a:bodyPr/>
+          <a:lstStyle/>
+          <a:p>
+            <a:r>
+              <a:rPr lang="en-US" dirty="0" smtClean="0"/>
+              <a:t>Unity Judgement - monkey</a:t>
+            </a:r>
+            <a:endParaRPr lang="en-US" dirty="0"/>
+          </a:p>
+        </p:txBody>
+      </p:sp>
+      <p:sp>
+        <p:nvSpPr>
+          <p:cNvPr id="8" name="TextBox 7"/>
+          <p:cNvSpPr txBox="1"/>
+          <p:nvPr/>
+        </p:nvSpPr>
+        <p:spPr>
+          <a:xfrm>
+            <a:off x="606490" y="2647566"/>
+            <a:ext cx="3485208" cy="2862322"/>
+          </a:xfrm>
+          <a:prstGeom prst="rect">
+            <a:avLst/>
+          </a:prstGeom>
+          <a:noFill/>
+        </p:spPr>
+        <p:txBody>
+          <a:bodyPr wrap="square" rtlCol="0">
+            <a:spAutoFit/>
+          </a:bodyPr>
+          <a:lstStyle/>
+          <a:p>
+            <a:pPr marL="285750" indent="-285750">
+              <a:buFont typeface="Arial" panose="020B0604020202020204" pitchFamily="34" charset="0"/>
+              <a:buChar char="•"/>
+            </a:pPr>
+            <a:r>
+              <a:rPr lang="en-US" dirty="0" smtClean="0"/>
+              <a:t>Data collapsed across 10 randomly selected days</a:t>
+            </a:r>
+          </a:p>
+          <a:p>
+            <a:pPr marL="285750" indent="-285750">
+              <a:buFont typeface="Arial" panose="020B0604020202020204" pitchFamily="34" charset="0"/>
+              <a:buChar char="•"/>
+            </a:pPr>
+            <a:endParaRPr lang="en-US" dirty="0" smtClean="0"/>
+          </a:p>
+          <a:p>
+            <a:pPr marL="285750" indent="-285750">
+              <a:buFont typeface="Arial" panose="020B0604020202020204" pitchFamily="34" charset="0"/>
+              <a:buChar char="•"/>
+            </a:pPr>
+            <a:r>
+              <a:rPr lang="en-US" dirty="0" smtClean="0"/>
+              <a:t>Monkey Y has a stereotyped behavior on -6A -6V that includes a mostly vertical saccade. Deciding if I want to discard this.</a:t>
+            </a:r>
+          </a:p>
+          <a:p>
+            <a:pPr marL="285750" indent="-285750">
+              <a:buFont typeface="Arial" panose="020B0604020202020204" pitchFamily="34" charset="0"/>
+              <a:buChar char="•"/>
+            </a:pPr>
+            <a:endParaRPr lang="en-US" dirty="0" smtClean="0"/>
+          </a:p>
+          <a:p>
+            <a:endParaRPr lang="en-US" dirty="0"/>
+          </a:p>
+        </p:txBody>
+      </p:sp>
+      <p:sp>
+        <p:nvSpPr>
+          <p:cNvPr id="10" name="TextBox 9"/>
+          <p:cNvSpPr txBox="1"/>
+          <p:nvPr/>
+        </p:nvSpPr>
+        <p:spPr>
+          <a:xfrm>
+            <a:off x="7065753" y="238718"/>
+            <a:ext cx="1979709" cy="369332"/>
+          </a:xfrm>
+          <a:prstGeom prst="rect">
+            <a:avLst/>
+          </a:prstGeom>
+          <a:noFill/>
+        </p:spPr>
+        <p:txBody>
+          <a:bodyPr wrap="none" rtlCol="0">
+            <a:spAutoFit/>
+          </a:bodyPr>
+          <a:lstStyle/>
+          <a:p>
+            <a:r>
+              <a:rPr lang="en-US" dirty="0" smtClean="0"/>
+              <a:t>Bayes – Bayes Joint</a:t>
+            </a:r>
+            <a:endParaRPr lang="en-US" dirty="0"/>
+          </a:p>
+        </p:txBody>
+      </p:sp>
+      <p:sp>
+        <p:nvSpPr>
+          <p:cNvPr id="11" name="TextBox 10"/>
+          <p:cNvSpPr txBox="1"/>
+          <p:nvPr/>
+        </p:nvSpPr>
+        <p:spPr>
+          <a:xfrm>
+            <a:off x="5663682" y="597160"/>
+            <a:ext cx="1067023" cy="369332"/>
+          </a:xfrm>
+          <a:prstGeom prst="rect">
+            <a:avLst/>
+          </a:prstGeom>
+          <a:noFill/>
+        </p:spPr>
+        <p:txBody>
+          <a:bodyPr wrap="none" rtlCol="0">
+            <a:spAutoFit/>
+          </a:bodyPr>
+          <a:lstStyle/>
+          <a:p>
+            <a:r>
+              <a:rPr lang="en-US" dirty="0" smtClean="0"/>
+              <a:t>Monkey J</a:t>
+            </a:r>
+            <a:endParaRPr lang="en-US" dirty="0"/>
+          </a:p>
+        </p:txBody>
+      </p:sp>
+      <p:sp>
+        <p:nvSpPr>
+          <p:cNvPr id="12" name="TextBox 11"/>
+          <p:cNvSpPr txBox="1"/>
+          <p:nvPr/>
+        </p:nvSpPr>
+        <p:spPr>
+          <a:xfrm>
+            <a:off x="9591866" y="597160"/>
+            <a:ext cx="1105495" cy="369332"/>
+          </a:xfrm>
+          <a:prstGeom prst="rect">
+            <a:avLst/>
+          </a:prstGeom>
+          <a:noFill/>
+        </p:spPr>
+        <p:txBody>
+          <a:bodyPr wrap="none" rtlCol="0">
+            <a:spAutoFit/>
+          </a:bodyPr>
+          <a:lstStyle/>
+          <a:p>
+            <a:r>
+              <a:rPr lang="en-US" dirty="0" smtClean="0"/>
+              <a:t>Monkey Y</a:t>
+            </a:r>
+            <a:endParaRPr lang="en-US" dirty="0"/>
+          </a:p>
+        </p:txBody>
+      </p:sp>
+      <p:pic>
+        <p:nvPicPr>
+          <p:cNvPr id="3" name="Picture 2"/>
+          <p:cNvPicPr>
+            <a:picLocks noChangeAspect="1"/>
+          </p:cNvPicPr>
+          <p:nvPr/>
+        </p:nvPicPr>
+        <p:blipFill>
+          <a:blip r:embed="rId2">
+            <a:extLst>
+              <a:ext uri="{28A0092B-C50C-407E-A947-70E740481C1C}">
+                <a14:useLocalDpi xmlns:a14="http://schemas.microsoft.com/office/drawing/2010/main" val="0"/>
+              </a:ext>
+            </a:extLst>
+          </a:blip>
+          <a:stretch>
+            <a:fillRect/>
+          </a:stretch>
+        </p:blipFill>
+        <p:spPr>
+          <a:xfrm>
+            <a:off x="8055607" y="868496"/>
+            <a:ext cx="3963910" cy="2971800"/>
+          </a:xfrm>
+          <a:prstGeom prst="rect">
+            <a:avLst/>
+          </a:prstGeom>
+        </p:spPr>
+      </p:pic>
+      <p:pic>
+        <p:nvPicPr>
+          <p:cNvPr id="9" name="Picture 8"/>
+          <p:cNvPicPr>
+            <a:picLocks noChangeAspect="1"/>
+          </p:cNvPicPr>
+          <p:nvPr/>
+        </p:nvPicPr>
+        <p:blipFill>
+          <a:blip r:embed="rId3">
+            <a:extLst>
+              <a:ext uri="{28A0092B-C50C-407E-A947-70E740481C1C}">
+                <a14:useLocalDpi xmlns:a14="http://schemas.microsoft.com/office/drawing/2010/main" val="0"/>
+              </a:ext>
+            </a:extLst>
+          </a:blip>
+          <a:stretch>
+            <a:fillRect/>
+          </a:stretch>
+        </p:blipFill>
+        <p:spPr>
+          <a:xfrm>
+            <a:off x="8055606" y="3653684"/>
+            <a:ext cx="3963910" cy="2971800"/>
+          </a:xfrm>
+          <a:prstGeom prst="rect">
+            <a:avLst/>
+          </a:prstGeom>
+        </p:spPr>
+      </p:pic>
+      <p:pic>
+        <p:nvPicPr>
+          <p:cNvPr id="14" name="Picture 13"/>
+          <p:cNvPicPr>
+            <a:picLocks noChangeAspect="1"/>
+          </p:cNvPicPr>
+          <p:nvPr/>
+        </p:nvPicPr>
+        <p:blipFill>
+          <a:blip r:embed="rId4">
+            <a:extLst>
+              <a:ext uri="{28A0092B-C50C-407E-A947-70E740481C1C}">
+                <a14:useLocalDpi xmlns:a14="http://schemas.microsoft.com/office/drawing/2010/main" val="0"/>
+              </a:ext>
+            </a:extLst>
+          </a:blip>
+          <a:stretch>
+            <a:fillRect/>
+          </a:stretch>
+        </p:blipFill>
+        <p:spPr>
+          <a:xfrm>
+            <a:off x="4091697" y="866167"/>
+            <a:ext cx="3963910" cy="2971800"/>
+          </a:xfrm>
+          <a:prstGeom prst="rect">
+            <a:avLst/>
+          </a:prstGeom>
+        </p:spPr>
+      </p:pic>
+      <p:pic>
+        <p:nvPicPr>
+          <p:cNvPr id="13" name="Picture 12"/>
+          <p:cNvPicPr>
+            <a:picLocks noChangeAspect="1"/>
+          </p:cNvPicPr>
+          <p:nvPr/>
+        </p:nvPicPr>
+        <p:blipFill>
+          <a:blip r:embed="rId5">
+            <a:extLst>
+              <a:ext uri="{28A0092B-C50C-407E-A947-70E740481C1C}">
+                <a14:useLocalDpi xmlns:a14="http://schemas.microsoft.com/office/drawing/2010/main" val="0"/>
+              </a:ext>
+            </a:extLst>
+          </a:blip>
+          <a:stretch>
+            <a:fillRect/>
+          </a:stretch>
+        </p:blipFill>
+        <p:spPr>
+          <a:xfrm>
+            <a:off x="4091695" y="3698023"/>
+            <a:ext cx="3963910" cy="2971800"/>
+          </a:xfrm>
+          <a:prstGeom prst="rect">
+            <a:avLst/>
+          </a:prstGeom>
+        </p:spPr>
+      </p:pic>
+    </p:spTree>
+    <p:extLst>
+      <p:ext uri="{BB962C8B-B14F-4D97-AF65-F5344CB8AC3E}">
+        <p14:creationId xmlns:p14="http://schemas.microsoft.com/office/powerpoint/2010/main" val="779636793"/>
+      </p:ext>
+    </p:extLst>
+  </p:cSld>
+  <p:clrMapOvr>
+    <a:masterClrMapping/>
+  </p:clrMapOvr>
+  <p:timing>
+    <p:tnLst>
+      <p:par>
+        <p:cTn id="1" dur="indefinite" restart="never" nodeType="tmRoot"/>
+      </p:par>
+    </p:tnLst>
+  </p:timing>
+</p:sld>
+</file>
+
+<file path=ppt/slides/slide5.xml><?xml version="1.0" encoding="utf-8"?>
+<p:sld xmlns:a="http://schemas.openxmlformats.org/drawingml/2006/main" xmlns:r="http://schemas.openxmlformats.org/officeDocument/2006/relationships" xmlns:p="http://schemas.openxmlformats.org/presentationml/2006/main">
+  <p:cSld>
+    <p:spTree>
+      <p:nvGrpSpPr>
+        <p:cNvPr id="1" name=""/>
+        <p:cNvGrpSpPr/>
+        <p:nvPr/>
+      </p:nvGrpSpPr>
+      <p:grpSpPr>
+        <a:xfrm>
+          <a:off x="0" y="0"/>
+          <a:ext cx="0" cy="0"/>
+          <a:chOff x="0" y="0"/>
+          <a:chExt cx="0" cy="0"/>
+        </a:xfrm>
+      </p:grpSpPr>
+      <p:sp>
+        <p:nvSpPr>
+          <p:cNvPr id="2" name="Title 1"/>
+          <p:cNvSpPr>
+            <a:spLocks noGrp="1"/>
+          </p:cNvSpPr>
+          <p:nvPr>
+            <p:ph type="title"/>
+          </p:nvPr>
+        </p:nvSpPr>
+        <p:spPr/>
+        <p:txBody>
+          <a:bodyPr/>
+          <a:lstStyle/>
+          <a:p>
+            <a:r>
+              <a:rPr lang="en-US" dirty="0" smtClean="0"/>
+              <a:t>Localization posterior </a:t>
+            </a:r>
+            <a:endParaRPr lang="en-US" dirty="0"/>
+          </a:p>
+        </p:txBody>
+      </p:sp>
+      <p:pic>
+        <p:nvPicPr>
+          <p:cNvPr id="1026" name="Picture 2" descr="https://lh5.googleusercontent.com/CN7rvgoLx4vL-t4ZhvRb4xKFJ9lH1kL2UC7XULAtQ0eRH0BYSGiL0cJdrd_m6Ix8wABD6pOLRXF-oJpQsPgAuFkiS6BbA_rjhXJbhbGV8WXLOW6FvJIyQbOPTEEjbPaQrAfvGM6M"/>
+          <p:cNvPicPr>
+            <a:picLocks noChangeAspect="1" noChangeArrowheads="1"/>
+          </p:cNvPicPr>
+          <p:nvPr/>
+        </p:nvPicPr>
+        <p:blipFill>
+          <a:blip r:embed="rId2">
+            <a:extLst>
+              <a:ext uri="{28A0092B-C50C-407E-A947-70E740481C1C}">
+                <a14:useLocalDpi xmlns:a14="http://schemas.microsoft.com/office/drawing/2010/main" val="0"/>
+              </a:ext>
+            </a:extLst>
+          </a:blip>
+          <a:srcRect/>
+          <a:stretch>
+            <a:fillRect/>
+          </a:stretch>
+        </p:blipFill>
+        <p:spPr bwMode="auto">
+          <a:xfrm>
+            <a:off x="390331" y="2211972"/>
+            <a:ext cx="5486400" cy="4114800"/>
+          </a:xfrm>
+          <a:prstGeom prst="rect">
+            <a:avLst/>
+          </a:prstGeom>
+          <a:noFill/>
+          <a:extLst>
+            <a:ext uri="{909E8E84-426E-40DD-AFC4-6F175D3DCCD1}">
+              <a14:hiddenFill xmlns:a14="http://schemas.microsoft.com/office/drawing/2010/main">
+                <a:solidFill>
+                  <a:srgbClr val="FFFFFF"/>
+                </a:solidFill>
+              </a14:hiddenFill>
+            </a:ext>
+          </a:extLst>
+        </p:spPr>
+      </p:pic>
+      <p:sp>
+        <p:nvSpPr>
+          <p:cNvPr id="4" name="TextBox 3"/>
+          <p:cNvSpPr txBox="1"/>
+          <p:nvPr/>
+        </p:nvSpPr>
+        <p:spPr>
+          <a:xfrm>
+            <a:off x="699341" y="970384"/>
+            <a:ext cx="10432079" cy="646331"/>
+          </a:xfrm>
+          <a:prstGeom prst="rect">
+            <a:avLst/>
+          </a:prstGeom>
+          <a:noFill/>
+        </p:spPr>
+        <p:txBody>
+          <a:bodyPr wrap="square" rtlCol="0">
+            <a:spAutoFit/>
+          </a:bodyPr>
+          <a:lstStyle/>
+          <a:p>
+            <a:r>
+              <a:rPr lang="en-US" dirty="0" smtClean="0"/>
+              <a:t>Can get a posterior distribution for p(</a:t>
+            </a:r>
+            <a:r>
+              <a:rPr lang="en-US" dirty="0" err="1" smtClean="0"/>
+              <a:t>sa,sv</a:t>
+            </a:r>
+            <a:r>
+              <a:rPr lang="en-US" dirty="0" err="1" smtClean="0"/>
+              <a:t>|xa,xv,C</a:t>
+            </a:r>
+            <a:r>
+              <a:rPr lang="en-US" dirty="0" smtClean="0"/>
+              <a:t>) [left], but in task I actually only get both </a:t>
+            </a:r>
+            <a:r>
+              <a:rPr lang="en-US" dirty="0" err="1" smtClean="0"/>
+              <a:t>sa</a:t>
+            </a:r>
+            <a:r>
+              <a:rPr lang="en-US" dirty="0" smtClean="0"/>
+              <a:t> and </a:t>
+            </a:r>
+            <a:r>
+              <a:rPr lang="en-US" dirty="0" err="1" smtClean="0"/>
+              <a:t>sv</a:t>
+            </a:r>
+            <a:r>
+              <a:rPr lang="en-US" dirty="0" smtClean="0"/>
+              <a:t> when two saccades are made, in the one saccade case </a:t>
+            </a:r>
+            <a:r>
+              <a:rPr lang="en-US" dirty="0" err="1" smtClean="0"/>
+              <a:t>sa</a:t>
+            </a:r>
+            <a:r>
+              <a:rPr lang="en-US" dirty="0" smtClean="0"/>
+              <a:t> = </a:t>
+            </a:r>
+            <a:r>
+              <a:rPr lang="en-US" dirty="0" err="1" smtClean="0"/>
+              <a:t>sv</a:t>
+            </a:r>
+            <a:r>
+              <a:rPr lang="en-US" dirty="0" smtClean="0"/>
+              <a:t>, which restricts responses to the diagonal. </a:t>
+            </a:r>
+            <a:endParaRPr lang="en-US" dirty="0"/>
+          </a:p>
+        </p:txBody>
+      </p:sp>
+      <p:pic>
+        <p:nvPicPr>
+          <p:cNvPr id="5" name="Picture 4"/>
+          <p:cNvPicPr>
+            <a:picLocks noChangeAspect="1"/>
+          </p:cNvPicPr>
+          <p:nvPr/>
+        </p:nvPicPr>
+        <p:blipFill>
+          <a:blip r:embed="rId3">
+            <a:extLst>
+              <a:ext uri="{28A0092B-C50C-407E-A947-70E740481C1C}">
+                <a14:useLocalDpi xmlns:a14="http://schemas.microsoft.com/office/drawing/2010/main" val="0"/>
+              </a:ext>
+            </a:extLst>
+          </a:blip>
+          <a:stretch>
+            <a:fillRect/>
+          </a:stretch>
+        </p:blipFill>
+        <p:spPr>
+          <a:xfrm>
+            <a:off x="6143840" y="2211971"/>
+            <a:ext cx="5486399" cy="4114800"/>
+          </a:xfrm>
+          <a:prstGeom prst="rect">
+            <a:avLst/>
+          </a:prstGeom>
+        </p:spPr>
+      </p:pic>
+      <p:sp>
+        <p:nvSpPr>
+          <p:cNvPr id="6" name="TextBox 5"/>
+          <p:cNvSpPr txBox="1"/>
+          <p:nvPr/>
+        </p:nvSpPr>
+        <p:spPr>
+          <a:xfrm>
+            <a:off x="2118049" y="1931437"/>
+            <a:ext cx="2765372" cy="369332"/>
+          </a:xfrm>
+          <a:prstGeom prst="rect">
+            <a:avLst/>
+          </a:prstGeom>
+          <a:noFill/>
+        </p:spPr>
+        <p:txBody>
+          <a:bodyPr wrap="none" rtlCol="0">
+            <a:spAutoFit/>
+          </a:bodyPr>
+          <a:lstStyle/>
+          <a:p>
+            <a:r>
+              <a:rPr lang="en-US" dirty="0" smtClean="0"/>
+              <a:t>MAP estimated distribution</a:t>
+            </a:r>
+            <a:endParaRPr lang="en-US" dirty="0"/>
+          </a:p>
+        </p:txBody>
+      </p:sp>
+      <p:sp>
+        <p:nvSpPr>
+          <p:cNvPr id="8" name="TextBox 7"/>
+          <p:cNvSpPr txBox="1"/>
+          <p:nvPr/>
+        </p:nvSpPr>
+        <p:spPr>
+          <a:xfrm>
+            <a:off x="8702224" y="1931437"/>
+            <a:ext cx="620554" cy="369332"/>
+          </a:xfrm>
+          <a:prstGeom prst="rect">
+            <a:avLst/>
+          </a:prstGeom>
+          <a:noFill/>
+        </p:spPr>
+        <p:txBody>
+          <a:bodyPr wrap="none" rtlCol="0">
+            <a:spAutoFit/>
+          </a:bodyPr>
+          <a:lstStyle/>
+          <a:p>
+            <a:r>
+              <a:rPr lang="en-US" dirty="0" smtClean="0"/>
+              <a:t>Data</a:t>
+            </a:r>
+            <a:endParaRPr lang="en-US" dirty="0"/>
+          </a:p>
+        </p:txBody>
+      </p:sp>
+    </p:spTree>
+    <p:extLst>
+      <p:ext uri="{BB962C8B-B14F-4D97-AF65-F5344CB8AC3E}">
+        <p14:creationId xmlns:p14="http://schemas.microsoft.com/office/powerpoint/2010/main" val="3123868591"/>
+      </p:ext>
+    </p:extLst>
+  </p:cSld>
+  <p:clrMapOvr>
+    <a:masterClrMapping/>
+  </p:clrMapOvr>
+  <p:timing>
+    <p:tnLst>
+      <p:par>
+        <p:cTn id="1" dur="indefinite" restart="never" nodeType="tmRoot"/>
+      </p:par>
+    </p:tnLst>
+  </p:timing>
+</p:sld>
+</file>
+
+<file path=ppt/slides/slide6.xml><?xml version="1.0" encoding="utf-8"?>
+<p:sld xmlns:a="http://schemas.openxmlformats.org/drawingml/2006/main" xmlns:r="http://schemas.openxmlformats.org/officeDocument/2006/relationships" xmlns:p="http://schemas.openxmlformats.org/presentationml/2006/main">
+  <p:cSld>
+    <p:spTree>
+      <p:nvGrpSpPr>
+        <p:cNvPr id="1" name=""/>
+        <p:cNvGrpSpPr/>
+        <p:nvPr/>
+      </p:nvGrpSpPr>
+      <p:grpSpPr>
+        <a:xfrm>
+          <a:off x="0" y="0"/>
+          <a:ext cx="0" cy="0"/>
+          <a:chOff x="0" y="0"/>
+          <a:chExt cx="0" cy="0"/>
+        </a:xfrm>
+      </p:grpSpPr>
+      <p:sp>
+        <p:nvSpPr>
+          <p:cNvPr id="2" name="Title 1"/>
+          <p:cNvSpPr>
+            <a:spLocks noGrp="1"/>
+          </p:cNvSpPr>
+          <p:nvPr>
+            <p:ph type="title"/>
+          </p:nvPr>
+        </p:nvSpPr>
+        <p:spPr/>
+        <p:txBody>
+          <a:bodyPr/>
+          <a:lstStyle/>
+          <a:p>
+            <a:r>
+              <a:rPr lang="en-US" dirty="0" smtClean="0"/>
+              <a:t>New posteriors</a:t>
+            </a:r>
+            <a:endParaRPr lang="en-US" dirty="0"/>
+          </a:p>
+        </p:txBody>
+      </p:sp>
+      <p:pic>
+        <p:nvPicPr>
+          <p:cNvPr id="1026" name="Picture 2" descr="C:\Users\jtm47\AppData\Local\Temp\7zE4C3925F3\-24A-6V_resp.png"/>
+          <p:cNvPicPr>
+            <a:picLocks noChangeAspect="1" noChangeArrowheads="1"/>
+          </p:cNvPicPr>
+          <p:nvPr/>
+        </p:nvPicPr>
+        <p:blipFill>
+          <a:blip r:embed="rId2">
+            <a:extLst>
+              <a:ext uri="{28A0092B-C50C-407E-A947-70E740481C1C}">
+                <a14:useLocalDpi xmlns:a14="http://schemas.microsoft.com/office/drawing/2010/main" val="0"/>
+              </a:ext>
+            </a:extLst>
+          </a:blip>
+          <a:srcRect/>
+          <a:stretch>
+            <a:fillRect/>
+          </a:stretch>
+        </p:blipFill>
+        <p:spPr bwMode="auto">
+          <a:xfrm>
+            <a:off x="6100618" y="2177810"/>
+            <a:ext cx="5488490" cy="4114800"/>
+          </a:xfrm>
+          <a:prstGeom prst="rect">
+            <a:avLst/>
+          </a:prstGeom>
+          <a:noFill/>
+          <a:extLst>
+            <a:ext uri="{909E8E84-426E-40DD-AFC4-6F175D3DCCD1}">
+              <a14:hiddenFill xmlns:a14="http://schemas.microsoft.com/office/drawing/2010/main">
+                <a:solidFill>
+                  <a:srgbClr val="FFFFFF"/>
+                </a:solidFill>
+              </a14:hiddenFill>
+            </a:ext>
+          </a:extLst>
+        </p:spPr>
+      </p:pic>
+      <p:pic>
+        <p:nvPicPr>
+          <p:cNvPr id="1027" name="Picture 3" descr="C:\Users\jtm47\AppData\Local\Temp\7zE4C3925F3\-24A-6V_pdf.png"/>
+          <p:cNvPicPr>
+            <a:picLocks noChangeAspect="1" noChangeArrowheads="1"/>
+          </p:cNvPicPr>
+          <p:nvPr/>
+        </p:nvPicPr>
+        <p:blipFill>
+          <a:blip r:embed="rId3">
+            <a:extLst>
+              <a:ext uri="{28A0092B-C50C-407E-A947-70E740481C1C}">
+                <a14:useLocalDpi xmlns:a14="http://schemas.microsoft.com/office/drawing/2010/main" val="0"/>
+              </a:ext>
+            </a:extLst>
+          </a:blip>
+          <a:srcRect/>
+          <a:stretch>
+            <a:fillRect/>
+          </a:stretch>
+        </p:blipFill>
+        <p:spPr bwMode="auto">
+          <a:xfrm>
+            <a:off x="612128" y="2177810"/>
+            <a:ext cx="5488490" cy="4114800"/>
+          </a:xfrm>
+          <a:prstGeom prst="rect">
+            <a:avLst/>
+          </a:prstGeom>
+          <a:noFill/>
+          <a:extLst>
+            <a:ext uri="{909E8E84-426E-40DD-AFC4-6F175D3DCCD1}">
+              <a14:hiddenFill xmlns:a14="http://schemas.microsoft.com/office/drawing/2010/main">
+                <a:solidFill>
+                  <a:srgbClr val="FFFFFF"/>
+                </a:solidFill>
+              </a14:hiddenFill>
+            </a:ext>
+          </a:extLst>
+        </p:spPr>
+      </p:pic>
+      <p:sp>
+        <p:nvSpPr>
+          <p:cNvPr id="7" name="TextBox 6"/>
+          <p:cNvSpPr txBox="1"/>
+          <p:nvPr/>
+        </p:nvSpPr>
+        <p:spPr>
+          <a:xfrm>
+            <a:off x="2118049" y="1931437"/>
+            <a:ext cx="2765372" cy="369332"/>
+          </a:xfrm>
+          <a:prstGeom prst="rect">
+            <a:avLst/>
+          </a:prstGeom>
+          <a:noFill/>
+        </p:spPr>
+        <p:txBody>
+          <a:bodyPr wrap="none" rtlCol="0">
+            <a:spAutoFit/>
+          </a:bodyPr>
+          <a:lstStyle/>
+          <a:p>
+            <a:r>
+              <a:rPr lang="en-US" dirty="0" smtClean="0"/>
+              <a:t>MAP estimated distribution</a:t>
+            </a:r>
+            <a:endParaRPr lang="en-US" dirty="0"/>
+          </a:p>
+        </p:txBody>
+      </p:sp>
+      <p:sp>
+        <p:nvSpPr>
+          <p:cNvPr id="8" name="TextBox 7"/>
+          <p:cNvSpPr txBox="1"/>
+          <p:nvPr/>
+        </p:nvSpPr>
+        <p:spPr>
+          <a:xfrm>
+            <a:off x="8702224" y="1931437"/>
+            <a:ext cx="620554" cy="369332"/>
+          </a:xfrm>
+          <a:prstGeom prst="rect">
+            <a:avLst/>
+          </a:prstGeom>
+          <a:noFill/>
+        </p:spPr>
+        <p:txBody>
+          <a:bodyPr wrap="none" rtlCol="0">
+            <a:spAutoFit/>
+          </a:bodyPr>
+          <a:lstStyle/>
+          <a:p>
+            <a:r>
+              <a:rPr lang="en-US" dirty="0" smtClean="0"/>
+              <a:t>Data</a:t>
+            </a:r>
+            <a:endParaRPr lang="en-US" dirty="0"/>
+          </a:p>
+        </p:txBody>
+      </p:sp>
+      <p:sp>
+        <p:nvSpPr>
+          <p:cNvPr id="9" name="TextBox 8"/>
+          <p:cNvSpPr txBox="1"/>
+          <p:nvPr/>
+        </p:nvSpPr>
+        <p:spPr>
+          <a:xfrm>
+            <a:off x="699341" y="970384"/>
+            <a:ext cx="10432079" cy="646331"/>
+          </a:xfrm>
+          <a:prstGeom prst="rect">
+            <a:avLst/>
+          </a:prstGeom>
+          <a:noFill/>
+        </p:spPr>
+        <p:txBody>
+          <a:bodyPr wrap="square" rtlCol="0">
+            <a:spAutoFit/>
+          </a:bodyPr>
+          <a:lstStyle/>
+          <a:p>
+            <a:r>
+              <a:rPr lang="en-US" dirty="0" smtClean="0"/>
+              <a:t>Calculate posterior under C=1 and C=2 </a:t>
+            </a:r>
+            <a:r>
+              <a:rPr lang="en-US" dirty="0" smtClean="0"/>
+              <a:t>conditions completely separately, reweight and sum according to posterior probability </a:t>
+            </a:r>
+            <a:r>
+              <a:rPr lang="en-US" dirty="0" err="1" smtClean="0"/>
+              <a:t>Pr</a:t>
+            </a:r>
+            <a:r>
+              <a:rPr lang="en-US" dirty="0" smtClean="0"/>
+              <a:t>(C=1). </a:t>
+            </a:r>
+            <a:endParaRPr lang="en-US" dirty="0"/>
+          </a:p>
+        </p:txBody>
+      </p:sp>
+    </p:spTree>
+    <p:extLst>
+      <p:ext uri="{BB962C8B-B14F-4D97-AF65-F5344CB8AC3E}">
+        <p14:creationId xmlns:p14="http://schemas.microsoft.com/office/powerpoint/2010/main" val="1584805850"/>
+      </p:ext>
+    </p:extLst>
+  </p:cSld>
+  <p:clrMapOvr>
+    <a:masterClrMapping/>
+  </p:clrMapOvr>
+</p:sld>
+</file>
+
+<file path=ppt/slides/slide7.xml><?xml version="1.0" encoding="utf-8"?>
+<p:sld xmlns:a="http://schemas.openxmlformats.org/drawingml/2006/main" xmlns:r="http://schemas.openxmlformats.org/officeDocument/2006/relationships" xmlns:p="http://schemas.openxmlformats.org/presentationml/2006/main">
+  <p:cSld>
+    <p:spTree>
+      <p:nvGrpSpPr>
+        <p:cNvPr id="1" name=""/>
+        <p:cNvGrpSpPr/>
+        <p:nvPr/>
+      </p:nvGrpSpPr>
+      <p:grpSpPr>
+        <a:xfrm>
+          <a:off x="0" y="0"/>
+          <a:ext cx="0" cy="0"/>
+          <a:chOff x="0" y="0"/>
+          <a:chExt cx="0" cy="0"/>
+        </a:xfrm>
+      </p:grpSpPr>
+      <p:pic>
+        <p:nvPicPr>
+          <p:cNvPr id="4" name="Content Placeholder 3"/>
+          <p:cNvPicPr>
+            <a:picLocks noGrp="1" noChangeAspect="1"/>
+          </p:cNvPicPr>
+          <p:nvPr>
+            <p:ph idx="1"/>
+          </p:nvPr>
+        </p:nvPicPr>
+        <p:blipFill>
+          <a:blip r:embed="rId2" cstate="print">
+            <a:extLst>
+              <a:ext uri="{28A0092B-C50C-407E-A947-70E740481C1C}">
+                <a14:useLocalDpi xmlns:a14="http://schemas.microsoft.com/office/drawing/2010/main" val="0"/>
+              </a:ext>
+            </a:extLst>
+          </a:blip>
+          <a:stretch>
+            <a:fillRect/>
+          </a:stretch>
+        </p:blipFill>
+        <p:spPr>
+          <a:xfrm>
+            <a:off x="485726" y="0"/>
+            <a:ext cx="11220548" cy="6858000"/>
+          </a:xfrm>
+        </p:spPr>
+      </p:pic>
+      <p:sp>
+        <p:nvSpPr>
+          <p:cNvPr id="5" name="Title 4"/>
+          <p:cNvSpPr>
+            <a:spLocks noGrp="1"/>
+          </p:cNvSpPr>
+          <p:nvPr>
+            <p:ph type="title"/>
+          </p:nvPr>
+        </p:nvSpPr>
+        <p:spPr/>
+        <p:txBody>
+          <a:bodyPr/>
+          <a:lstStyle/>
+          <a:p>
+            <a:r>
+              <a:rPr lang="en-US" dirty="0" smtClean="0"/>
+              <a:t>B_B_J</a:t>
+            </a:r>
+            <a:endParaRPr lang="en-US" dirty="0"/>
+          </a:p>
+        </p:txBody>
+      </p:sp>
+    </p:spTree>
+    <p:extLst>
+      <p:ext uri="{BB962C8B-B14F-4D97-AF65-F5344CB8AC3E}">
+        <p14:creationId xmlns:p14="http://schemas.microsoft.com/office/powerpoint/2010/main" val="4192070895"/>
+      </p:ext>
+    </p:extLst>
+  </p:cSld>
+  <p:clrMapOvr>
+    <a:masterClrMapping/>
+  </p:clrMapOvr>
+</p:sld>
+</file>
+
+<file path=ppt/slides/slide8.xml><?xml version="1.0" encoding="utf-8"?>
+<p:sld xmlns:a="http://schemas.openxmlformats.org/drawingml/2006/main" xmlns:r="http://schemas.openxmlformats.org/officeDocument/2006/relationships" xmlns:p="http://schemas.openxmlformats.org/presentationml/2006/main">
+  <p:cSld>
+    <p:spTree>
+      <p:nvGrpSpPr>
+        <p:cNvPr id="1" name=""/>
+        <p:cNvGrpSpPr/>
+        <p:nvPr/>
+      </p:nvGrpSpPr>
+      <p:grpSpPr>
+        <a:xfrm>
+          <a:off x="0" y="0"/>
+          <a:ext cx="0" cy="0"/>
+          <a:chOff x="0" y="0"/>
+          <a:chExt cx="0" cy="0"/>
+        </a:xfrm>
+      </p:grpSpPr>
+      <p:sp>
+        <p:nvSpPr>
+          <p:cNvPr id="2" name="Title 1"/>
+          <p:cNvSpPr>
+            <a:spLocks noGrp="1"/>
+          </p:cNvSpPr>
+          <p:nvPr>
+            <p:ph type="title"/>
+          </p:nvPr>
+        </p:nvSpPr>
+        <p:spPr/>
+        <p:txBody>
+          <a:bodyPr/>
+          <a:lstStyle/>
+          <a:p>
+            <a:endParaRPr lang="en-US"/>
+          </a:p>
+        </p:txBody>
+      </p:sp>
+      <p:pic>
+        <p:nvPicPr>
+          <p:cNvPr id="6" name="Content Placeholder 5"/>
+          <p:cNvPicPr>
+            <a:picLocks noGrp="1" noChangeAspect="1"/>
+          </p:cNvPicPr>
+          <p:nvPr>
+            <p:ph idx="1"/>
+          </p:nvPr>
+        </p:nvPicPr>
+        <p:blipFill>
+          <a:blip r:embed="rId2" cstate="print">
+            <a:extLst>
+              <a:ext uri="{28A0092B-C50C-407E-A947-70E740481C1C}">
+                <a14:useLocalDpi xmlns:a14="http://schemas.microsoft.com/office/drawing/2010/main" val="0"/>
+              </a:ext>
+            </a:extLst>
+          </a:blip>
+          <a:stretch>
+            <a:fillRect/>
+          </a:stretch>
+        </p:blipFill>
+        <p:spPr>
+          <a:xfrm>
+            <a:off x="485726" y="0"/>
+            <a:ext cx="11220549" cy="6858000"/>
+          </a:xfrm>
+        </p:spPr>
+      </p:pic>
+    </p:spTree>
+    <p:extLst>
+      <p:ext uri="{BB962C8B-B14F-4D97-AF65-F5344CB8AC3E}">
+        <p14:creationId xmlns:p14="http://schemas.microsoft.com/office/powerpoint/2010/main" val="525921297"/>
+      </p:ext>
+    </p:extLst>
+  </p:cSld>
+  <p:clrMapOvr>
+    <a:masterClrMapping/>
+  </p:clrMapOvr>
+</p:sld>
+</file>
+
+<file path=ppt/slides/slide9.xml><?xml version="1.0" encoding="utf-8"?>
+<p:sld xmlns:a="http://schemas.openxmlformats.org/drawingml/2006/main" xmlns:r="http://schemas.openxmlformats.org/officeDocument/2006/relationships" xmlns:p="http://schemas.openxmlformats.org/presentationml/2006/main">
+  <p:cSld>
+    <p:spTree>
+      <p:nvGrpSpPr>
+        <p:cNvPr id="1" name=""/>
+        <p:cNvGrpSpPr/>
+        <p:nvPr/>
+      </p:nvGrpSpPr>
+      <p:grpSpPr>
+        <a:xfrm>
+          <a:off x="0" y="0"/>
+          <a:ext cx="0" cy="0"/>
+          <a:chOff x="0" y="0"/>
+          <a:chExt cx="0" cy="0"/>
+        </a:xfrm>
+      </p:grpSpPr>
+      <p:sp>
+        <p:nvSpPr>
+          <p:cNvPr id="2" name="Title 1"/>
+          <p:cNvSpPr>
+            <a:spLocks noGrp="1"/>
+          </p:cNvSpPr>
+          <p:nvPr>
+            <p:ph type="title"/>
+          </p:nvPr>
+        </p:nvSpPr>
+        <p:spPr/>
+        <p:txBody>
+          <a:bodyPr/>
+          <a:lstStyle/>
+          <a:p>
+            <a:endParaRPr lang="en-US"/>
+          </a:p>
+        </p:txBody>
+      </p:sp>
+      <p:pic>
+        <p:nvPicPr>
+          <p:cNvPr id="4" name="Content Placeholder 3"/>
+          <p:cNvPicPr>
+            <a:picLocks noGrp="1" noChangeAspect="1"/>
+          </p:cNvPicPr>
+          <p:nvPr>
+            <p:ph idx="1"/>
+          </p:nvPr>
+        </p:nvPicPr>
+        <p:blipFill>
+          <a:blip r:embed="rId2" cstate="print">
+            <a:extLst>
+              <a:ext uri="{28A0092B-C50C-407E-A947-70E740481C1C}">
+                <a14:useLocalDpi xmlns:a14="http://schemas.microsoft.com/office/drawing/2010/main" val="0"/>
+              </a:ext>
+            </a:extLst>
+          </a:blip>
+          <a:stretch>
+            <a:fillRect/>
+          </a:stretch>
+        </p:blipFill>
+        <p:spPr>
+          <a:xfrm>
+            <a:off x="485726" y="0"/>
+            <a:ext cx="11220549" cy="6858000"/>
+          </a:xfrm>
+        </p:spPr>
+      </p:pic>
+    </p:spTree>
+    <p:extLst>
+      <p:ext uri="{BB962C8B-B14F-4D97-AF65-F5344CB8AC3E}">
+        <p14:creationId xmlns:p14="http://schemas.microsoft.com/office/powerpoint/2010/main" val="3238976316"/>
+      </p:ext>
+    </p:extLst>
+  </p:cSld>
+  <p:clrMapOvr>
+    <a:masterClrMapping/>
+  </p:clrMapOvr>
 </p:sld>
 </file>
 
@@ -4890,4 +6922,265 @@
     </a:ext>
   </a:extLst>
 </a:theme>
+</file>
+
+<file path=ppt/theme/theme2.xml><?xml version="1.0" encoding="utf-8"?>
+<a:theme xmlns:a="http://schemas.openxmlformats.org/drawingml/2006/main" name="Office Theme">
+  <a:themeElements>
+    <a:clrScheme name="Office">
+      <a:dk1>
+        <a:sysClr val="windowText" lastClr="000000"/>
+      </a:dk1>
+      <a:lt1>
+        <a:sysClr val="window" lastClr="FFFFFF"/>
+      </a:lt1>
+      <a:dk2>
+        <a:srgbClr val="44546A"/>
+      </a:dk2>
+      <a:lt2>
+        <a:srgbClr val="E7E6E6"/>
+      </a:lt2>
+      <a:accent1>
+        <a:srgbClr val="5B9BD5"/>
+      </a:accent1>
+      <a:accent2>
+        <a:srgbClr val="ED7D31"/>
+      </a:accent2>
+      <a:accent3>
+        <a:srgbClr val="A5A5A5"/>
+      </a:accent3>
+      <a:accent4>
+        <a:srgbClr val="FFC000"/>
+      </a:accent4>
+      <a:accent5>
+        <a:srgbClr val="4472C4"/>
+      </a:accent5>
+      <a:accent6>
+        <a:srgbClr val="70AD47"/>
+      </a:accent6>
+      <a:hlink>
+        <a:srgbClr val="0563C1"/>
+      </a:hlink>
+      <a:folHlink>
+        <a:srgbClr val="954F72"/>
+      </a:folHlink>
+    </a:clrScheme>
+    <a:fontScheme name="Office">
+      <a:majorFont>
+        <a:latin typeface="Calibri Light" panose="020F0302020204030204"/>
+        <a:ea typeface=""/>
+        <a:cs typeface=""/>
+        <a:font script="Jpan" typeface="ＭＳ Ｐゴシック"/>
+        <a:font script="Hang" typeface="맑은 고딕"/>
+        <a:font script="Hans" typeface="宋体"/>
+        <a:font script="Hant" typeface="新細明體"/>
+        <a:font script="Arab" typeface="Times New Roman"/>
+        <a:font script="Hebr" typeface="Times New Roman"/>
+        <a:font script="Thai" typeface="Angsana New"/>
+        <a:font script="Ethi" typeface="Nyala"/>
+        <a:font script="Beng" typeface="Vrinda"/>
+        <a:font script="Gujr" typeface="Shruti"/>
+        <a:font script="Khmr" typeface="MoolBoran"/>
+        <a:font script="Knda" typeface="Tunga"/>
+        <a:font script="Guru" typeface="Raavi"/>
+        <a:font script="Cans" typeface="Euphemia"/>
+        <a:font script="Cher" typeface="Plantagenet Cherokee"/>
+        <a:font script="Yiii" typeface="Microsoft Yi Baiti"/>
+        <a:font script="Tibt" typeface="Microsoft Himalaya"/>
+        <a:font script="Thaa" typeface="MV Boli"/>
+        <a:font script="Deva" typeface="Mangal"/>
+        <a:font script="Telu" typeface="Gautami"/>
+        <a:font script="Taml" typeface="Latha"/>
+        <a:font script="Syrc" typeface="Estrangelo Edessa"/>
+        <a:font script="Orya" typeface="Kalinga"/>
+        <a:font script="Mlym" typeface="Kartika"/>
+        <a:font script="Laoo" typeface="DokChampa"/>
+        <a:font script="Sinh" typeface="Iskoola Pota"/>
+        <a:font script="Mong" typeface="Mongolian Baiti"/>
+        <a:font script="Viet" typeface="Times New Roman"/>
+        <a:font script="Uigh" typeface="Microsoft Uighur"/>
+        <a:font script="Geor" typeface="Sylfaen"/>
+      </a:majorFont>
+      <a:minorFont>
+        <a:latin typeface="Calibri" panose="020F0502020204030204"/>
+        <a:ea typeface=""/>
+        <a:cs typeface=""/>
+        <a:font script="Jpan" typeface="ＭＳ Ｐゴシック"/>
+        <a:font script="Hang" typeface="맑은 고딕"/>
+        <a:font script="Hans" typeface="宋体"/>
+        <a:font script="Hant" typeface="新細明體"/>
+        <a:font script="Arab" typeface="Arial"/>
+        <a:font script="Hebr" typeface="Arial"/>
+        <a:font script="Thai" typeface="Cordia New"/>
+        <a:font script="Ethi" typeface="Nyala"/>
+        <a:font script="Beng" typeface="Vrinda"/>
+        <a:font script="Gujr" typeface="Shruti"/>
+        <a:font script="Khmr" typeface="DaunPenh"/>
+        <a:font script="Knda" typeface="Tunga"/>
+        <a:font script="Guru" typeface="Raavi"/>
+        <a:font script="Cans" typeface="Euphemia"/>
+        <a:font script="Cher" typeface="Plantagenet Cherokee"/>
+        <a:font script="Yiii" typeface="Microsoft Yi Baiti"/>
+        <a:font script="Tibt" typeface="Microsoft Himalaya"/>
+        <a:font script="Thaa" typeface="MV Boli"/>
+        <a:font script="Deva" typeface="Mangal"/>
+        <a:font script="Telu" typeface="Gautami"/>
+        <a:font script="Taml" typeface="Latha"/>
+        <a:font script="Syrc" typeface="Estrangelo Edessa"/>
+        <a:font script="Orya" typeface="Kalinga"/>
+        <a:font script="Mlym" typeface="Kartika"/>
+        <a:font script="Laoo" typeface="DokChampa"/>
+        <a:font script="Sinh" typeface="Iskoola Pota"/>
+        <a:font script="Mong" typeface="Mongolian Baiti"/>
+        <a:font script="Viet" typeface="Arial"/>
+        <a:font script="Uigh" typeface="Microsoft Uighur"/>
+        <a:font script="Geor" typeface="Sylfaen"/>
+      </a:minorFont>
+    </a:fontScheme>
+    <a:fmtScheme name="Office">
+      <a:fillStyleLst>
+        <a:solidFill>
+          <a:schemeClr val="phClr"/>
+        </a:solidFill>
+        <a:gradFill rotWithShape="1">
+          <a:gsLst>
+            <a:gs pos="0">
+              <a:schemeClr val="phClr">
+                <a:lumMod val="110000"/>
+                <a:satMod val="105000"/>
+                <a:tint val="67000"/>
+              </a:schemeClr>
+            </a:gs>
+            <a:gs pos="50000">
+              <a:schemeClr val="phClr">
+                <a:lumMod val="105000"/>
+                <a:satMod val="103000"/>
+                <a:tint val="73000"/>
+              </a:schemeClr>
+            </a:gs>
+            <a:gs pos="100000">
+              <a:schemeClr val="phClr">
+                <a:lumMod val="105000"/>
+                <a:satMod val="109000"/>
+                <a:tint val="81000"/>
+              </a:schemeClr>
+            </a:gs>
+          </a:gsLst>
+          <a:lin ang="5400000" scaled="0"/>
+        </a:gradFill>
+        <a:gradFill rotWithShape="1">
+          <a:gsLst>
+            <a:gs pos="0">
+              <a:schemeClr val="phClr">
+                <a:satMod val="103000"/>
+                <a:lumMod val="102000"/>
+                <a:tint val="94000"/>
+              </a:schemeClr>
+            </a:gs>
+            <a:gs pos="50000">
+              <a:schemeClr val="phClr">
+                <a:satMod val="110000"/>
+                <a:lumMod val="100000"/>
+                <a:shade val="100000"/>
+              </a:schemeClr>
+            </a:gs>
+            <a:gs pos="100000">
+              <a:schemeClr val="phClr">
+                <a:lumMod val="99000"/>
+                <a:satMod val="120000"/>
+                <a:shade val="78000"/>
+              </a:schemeClr>
+            </a:gs>
+          </a:gsLst>
+          <a:lin ang="5400000" scaled="0"/>
+        </a:gradFill>
+      </a:fillStyleLst>
+      <a:lnStyleLst>
+        <a:ln w="6350" cap="flat" cmpd="sng" algn="ctr">
+          <a:solidFill>
+            <a:schemeClr val="phClr"/>
+          </a:solidFill>
+          <a:prstDash val="solid"/>
+          <a:miter lim="800000"/>
+        </a:ln>
+        <a:ln w="12700" cap="flat" cmpd="sng" algn="ctr">
+          <a:solidFill>
+            <a:schemeClr val="phClr"/>
+          </a:solidFill>
+          <a:prstDash val="solid"/>
+          <a:miter lim="800000"/>
+        </a:ln>
+        <a:ln w="19050" cap="flat" cmpd="sng" algn="ctr">
+          <a:solidFill>
+            <a:schemeClr val="phClr"/>
+          </a:solidFill>
+          <a:prstDash val="solid"/>
+          <a:miter lim="800000"/>
+        </a:ln>
+      </a:lnStyleLst>
+      <a:effectStyleLst>
+        <a:effectStyle>
+          <a:effectLst/>
+        </a:effectStyle>
+        <a:effectStyle>
+          <a:effectLst/>
+        </a:effectStyle>
+        <a:effectStyle>
+          <a:effectLst>
+            <a:outerShdw blurRad="57150" dist="19050" dir="5400000" algn="ctr" rotWithShape="0">
+              <a:srgbClr val="000000">
+                <a:alpha val="63000"/>
+              </a:srgbClr>
+            </a:outerShdw>
+          </a:effectLst>
+        </a:effectStyle>
+      </a:effectStyleLst>
+      <a:bgFillStyleLst>
+        <a:solidFill>
+          <a:schemeClr val="phClr"/>
+        </a:solidFill>
+        <a:solidFill>
+          <a:schemeClr val="phClr">
+            <a:tint val="95000"/>
+            <a:satMod val="170000"/>
+          </a:schemeClr>
+        </a:solidFill>
+        <a:gradFill rotWithShape="1">
+          <a:gsLst>
+            <a:gs pos="0">
+              <a:schemeClr val="phClr">
+                <a:tint val="93000"/>
+                <a:satMod val="150000"/>
+                <a:shade val="98000"/>
+                <a:lumMod val="102000"/>
+              </a:schemeClr>
+            </a:gs>
+            <a:gs pos="50000">
+              <a:schemeClr val="phClr">
+                <a:tint val="98000"/>
+                <a:satMod val="130000"/>
+                <a:shade val="90000"/>
+                <a:lumMod val="103000"/>
+              </a:schemeClr>
+            </a:gs>
+            <a:gs pos="100000">
+              <a:schemeClr val="phClr">
+                <a:shade val="63000"/>
+                <a:satMod val="120000"/>
+              </a:schemeClr>
+            </a:gs>
+          </a:gsLst>
+          <a:lin ang="5400000" scaled="0"/>
+        </a:gradFill>
+      </a:bgFillStyleLst>
+    </a:fmtScheme>
+  </a:themeElements>
+  <a:objectDefaults/>
+  <a:extraClrSchemeLst/>
+  <a:extLst>
+    <a:ext uri="{05A4C25C-085E-4340-85A3-A5531E510DB2}">
+      <thm15:themeFamily xmlns:thm15="http://schemas.microsoft.com/office/thememl/2012/main" name="Office Theme" id="{62F939B6-93AF-4DB8-9C6B-D6C7DFDC589F}" vid="{4A3C46E8-61CC-4603-A589-7422A47A8E4A}"/>
+    </a:ext>
+  </a:extLst>
+</a:theme>
 </file>
</xml_diff>